<commit_message>
add test for hybrid model
</commit_message>
<xml_diff>
--- a/doc/workshop/reducedOrderModeling/ROM.pptx
+++ b/doc/workshop/reducedOrderModeling/ROM.pptx
@@ -5,10 +5,10 @@
     <p:sldMasterId id="2147483660" r:id="rId1"/>
   </p:sldMasterIdLst>
   <p:notesMasterIdLst>
-    <p:notesMasterId r:id="rId33"/>
+    <p:notesMasterId r:id="rId31"/>
   </p:notesMasterIdLst>
   <p:handoutMasterIdLst>
-    <p:handoutMasterId r:id="rId34"/>
+    <p:handoutMasterId r:id="rId32"/>
   </p:handoutMasterIdLst>
   <p:sldIdLst>
     <p:sldId id="272" r:id="rId2"/>
@@ -38,10 +38,8 @@
     <p:sldId id="346" r:id="rId26"/>
     <p:sldId id="347" r:id="rId27"/>
     <p:sldId id="348" r:id="rId28"/>
-    <p:sldId id="286" r:id="rId29"/>
-    <p:sldId id="282" r:id="rId30"/>
-    <p:sldId id="312" r:id="rId31"/>
-    <p:sldId id="284" r:id="rId32"/>
+    <p:sldId id="349" r:id="rId29"/>
+    <p:sldId id="284" r:id="rId30"/>
   </p:sldIdLst>
   <p:sldSz cx="9144000" cy="6858000" type="screen4x3"/>
   <p:notesSz cx="7010400" cy="9296400"/>
@@ -997,184 +995,6 @@
     <p:extLst>
       <p:ext uri="{BB962C8B-B14F-4D97-AF65-F5344CB8AC3E}">
         <p14:creationId xmlns:p14="http://schemas.microsoft.com/office/powerpoint/2010/main" val="2246505812"/>
-      </p:ext>
-    </p:extLst>
-  </p:cSld>
-  <p:clrMapOvr>
-    <a:masterClrMapping/>
-  </p:clrMapOvr>
-</p:notes>
-</file>
-
-<file path=ppt/notesSlides/notesSlide4.xml><?xml version="1.0" encoding="utf-8"?>
-<p:notes xmlns:a="http://schemas.openxmlformats.org/drawingml/2006/main" xmlns:r="http://schemas.openxmlformats.org/officeDocument/2006/relationships" xmlns:p="http://schemas.openxmlformats.org/presentationml/2006/main">
-  <p:cSld>
-    <p:spTree>
-      <p:nvGrpSpPr>
-        <p:cNvPr id="1" name=""/>
-        <p:cNvGrpSpPr/>
-        <p:nvPr/>
-      </p:nvGrpSpPr>
-      <p:grpSpPr>
-        <a:xfrm>
-          <a:off x="0" y="0"/>
-          <a:ext cx="0" cy="0"/>
-          <a:chOff x="0" y="0"/>
-          <a:chExt cx="0" cy="0"/>
-        </a:xfrm>
-      </p:grpSpPr>
-      <p:sp>
-        <p:nvSpPr>
-          <p:cNvPr id="2" name="Slide Image Placeholder 1"/>
-          <p:cNvSpPr>
-            <a:spLocks noGrp="1" noRot="1" noChangeAspect="1"/>
-          </p:cNvSpPr>
-          <p:nvPr>
-            <p:ph type="sldImg"/>
-          </p:nvPr>
-        </p:nvSpPr>
-        <p:spPr/>
-      </p:sp>
-      <p:sp>
-        <p:nvSpPr>
-          <p:cNvPr id="3" name="Notes Placeholder 2"/>
-          <p:cNvSpPr>
-            <a:spLocks noGrp="1"/>
-          </p:cNvSpPr>
-          <p:nvPr>
-            <p:ph type="body" idx="1"/>
-          </p:nvPr>
-        </p:nvSpPr>
-        <p:spPr/>
-        <p:txBody>
-          <a:bodyPr/>
-          <a:lstStyle/>
-          <a:p>
-            <a:r>
-              <a:rPr lang="en-US" dirty="0" smtClean="0"/>
-              <a:t>Add backup slides for some algorithms GPM and SVM</a:t>
-            </a:r>
-            <a:endParaRPr lang="en-US" dirty="0"/>
-          </a:p>
-        </p:txBody>
-      </p:sp>
-      <p:sp>
-        <p:nvSpPr>
-          <p:cNvPr id="4" name="Slide Number Placeholder 3"/>
-          <p:cNvSpPr>
-            <a:spLocks noGrp="1"/>
-          </p:cNvSpPr>
-          <p:nvPr>
-            <p:ph type="sldNum" sz="quarter" idx="10"/>
-          </p:nvPr>
-        </p:nvSpPr>
-        <p:spPr/>
-        <p:txBody>
-          <a:bodyPr/>
-          <a:lstStyle/>
-          <a:p>
-            <a:fld id="{55ECFD52-9CA0-4306-99FC-201DA20A9336}" type="slidenum">
-              <a:rPr lang="en-US" smtClean="0"/>
-              <a:pPr/>
-              <a:t>29</a:t>
-            </a:fld>
-            <a:endParaRPr lang="en-US"/>
-          </a:p>
-        </p:txBody>
-      </p:sp>
-    </p:spTree>
-    <p:extLst>
-      <p:ext uri="{BB962C8B-B14F-4D97-AF65-F5344CB8AC3E}">
-        <p14:creationId xmlns:p14="http://schemas.microsoft.com/office/powerpoint/2010/main" val="1468251276"/>
-      </p:ext>
-    </p:extLst>
-  </p:cSld>
-  <p:clrMapOvr>
-    <a:masterClrMapping/>
-  </p:clrMapOvr>
-</p:notes>
-</file>
-
-<file path=ppt/notesSlides/notesSlide5.xml><?xml version="1.0" encoding="utf-8"?>
-<p:notes xmlns:a="http://schemas.openxmlformats.org/drawingml/2006/main" xmlns:r="http://schemas.openxmlformats.org/officeDocument/2006/relationships" xmlns:p="http://schemas.openxmlformats.org/presentationml/2006/main">
-  <p:cSld>
-    <p:spTree>
-      <p:nvGrpSpPr>
-        <p:cNvPr id="1" name=""/>
-        <p:cNvGrpSpPr/>
-        <p:nvPr/>
-      </p:nvGrpSpPr>
-      <p:grpSpPr>
-        <a:xfrm>
-          <a:off x="0" y="0"/>
-          <a:ext cx="0" cy="0"/>
-          <a:chOff x="0" y="0"/>
-          <a:chExt cx="0" cy="0"/>
-        </a:xfrm>
-      </p:grpSpPr>
-      <p:sp>
-        <p:nvSpPr>
-          <p:cNvPr id="2" name="Slide Image Placeholder 1"/>
-          <p:cNvSpPr>
-            <a:spLocks noGrp="1" noRot="1" noChangeAspect="1"/>
-          </p:cNvSpPr>
-          <p:nvPr>
-            <p:ph type="sldImg"/>
-          </p:nvPr>
-        </p:nvSpPr>
-        <p:spPr/>
-      </p:sp>
-      <p:sp>
-        <p:nvSpPr>
-          <p:cNvPr id="3" name="Notes Placeholder 2"/>
-          <p:cNvSpPr>
-            <a:spLocks noGrp="1"/>
-          </p:cNvSpPr>
-          <p:nvPr>
-            <p:ph type="body" idx="1"/>
-          </p:nvPr>
-        </p:nvSpPr>
-        <p:spPr/>
-        <p:txBody>
-          <a:bodyPr/>
-          <a:lstStyle/>
-          <a:p>
-            <a:r>
-              <a:rPr lang="en-US" dirty="0" smtClean="0"/>
-              <a:t>Add backup slides for some algorithms GPM and SVM</a:t>
-            </a:r>
-            <a:endParaRPr lang="en-US" dirty="0"/>
-          </a:p>
-        </p:txBody>
-      </p:sp>
-      <p:sp>
-        <p:nvSpPr>
-          <p:cNvPr id="4" name="Slide Number Placeholder 3"/>
-          <p:cNvSpPr>
-            <a:spLocks noGrp="1"/>
-          </p:cNvSpPr>
-          <p:nvPr>
-            <p:ph type="sldNum" sz="quarter" idx="10"/>
-          </p:nvPr>
-        </p:nvSpPr>
-        <p:spPr/>
-        <p:txBody>
-          <a:bodyPr/>
-          <a:lstStyle/>
-          <a:p>
-            <a:fld id="{55ECFD52-9CA0-4306-99FC-201DA20A9336}" type="slidenum">
-              <a:rPr lang="en-US" smtClean="0"/>
-              <a:pPr/>
-              <a:t>30</a:t>
-            </a:fld>
-            <a:endParaRPr lang="en-US"/>
-          </a:p>
-        </p:txBody>
-      </p:sp>
-    </p:spTree>
-    <p:extLst>
-      <p:ext uri="{BB962C8B-B14F-4D97-AF65-F5344CB8AC3E}">
-        <p14:creationId xmlns:p14="http://schemas.microsoft.com/office/powerpoint/2010/main" val="1468251276"/>
       </p:ext>
     </p:extLst>
   </p:cSld>
@@ -52955,30 +52775,16 @@
             <p:ph type="title"/>
           </p:nvPr>
         </p:nvSpPr>
-        <p:spPr>
-          <a:xfrm>
-            <a:off x="455613" y="1004888"/>
-            <a:ext cx="8231187" cy="377026"/>
-          </a:xfrm>
-        </p:spPr>
+        <p:spPr/>
         <p:txBody>
           <a:bodyPr/>
           <a:lstStyle/>
           <a:p>
-            <a:pPr lvl="1"/>
-            <a:r>
-              <a:rPr lang="en-US" b="0" dirty="0" smtClean="0"/>
-              <a:t>Multi-Dimensional </a:t>
-            </a:r>
-            <a:r>
-              <a:rPr lang="en-US" b="0" dirty="0"/>
-              <a:t>I</a:t>
-            </a:r>
-            <a:r>
-              <a:rPr lang="en-US" b="0" dirty="0" smtClean="0"/>
-              <a:t>nterpolators</a:t>
-            </a:r>
-            <a:endParaRPr lang="en-US" b="0" dirty="0"/>
+            <a:r>
+              <a:rPr lang="en-US" dirty="0" smtClean="0"/>
+              <a:t>Example</a:t>
+            </a:r>
+            <a:endParaRPr lang="en-US" dirty="0"/>
           </a:p>
         </p:txBody>
       </p:sp>
@@ -52998,79 +52804,74 @@
           <a:lstStyle/>
           <a:p>
             <a:r>
-              <a:rPr lang="en-US" dirty="0" smtClean="0">
-                <a:solidFill>
-                  <a:srgbClr val="3366FF"/>
-                </a:solidFill>
-              </a:rPr>
-              <a:t>CROW</a:t>
-            </a:r>
-            <a:r>
               <a:rPr lang="en-US" dirty="0" smtClean="0"/>
-              <a:t>: Internally developed </a:t>
-            </a:r>
-            <a:r>
-              <a:rPr lang="en-US" dirty="0">
-                <a:latin typeface="Courier"/>
-                <a:cs typeface="Courier"/>
-              </a:rPr>
-              <a:t>C</a:t>
-            </a:r>
-            <a:r>
-              <a:rPr lang="en-US" dirty="0" smtClean="0">
-                <a:latin typeface="Courier"/>
-                <a:cs typeface="Courier"/>
-              </a:rPr>
-              <a:t>++ </a:t>
-            </a:r>
-            <a:r>
-              <a:rPr lang="en-US" dirty="0" smtClean="0"/>
-              <a:t>library</a:t>
+              <a:t>Construct a ROM: 2_train_rom.xml</a:t>
             </a:r>
           </a:p>
           <a:p>
             <a:r>
               <a:rPr lang="en-US" dirty="0" smtClean="0"/>
-              <a:t>Interpolation on any dimension</a:t>
+              <a:t>Pickle a ROM: 3_pickle_rom.xml</a:t>
             </a:r>
           </a:p>
           <a:p>
             <a:r>
               <a:rPr lang="en-US" dirty="0" smtClean="0"/>
-              <a:t>Response surface is created as an </a:t>
-            </a:r>
-            <a:r>
-              <a:rPr lang="en-US" dirty="0" smtClean="0">
-                <a:solidFill>
-                  <a:srgbClr val="3366FF"/>
-                </a:solidFill>
-              </a:rPr>
-              <a:t>interpolation function </a:t>
-            </a:r>
+              <a:t>Load a ROM: 4_load_rom.xml</a:t>
+            </a:r>
+          </a:p>
+          <a:p>
             <a:r>
               <a:rPr lang="en-US" dirty="0" smtClean="0"/>
-              <a:t>given a set of data points defined on:</a:t>
+              <a:t>Sample a ROM: 5_sample_rom.xml</a:t>
+            </a:r>
+          </a:p>
+          <a:p>
+            <a:r>
+              <a:rPr lang="en-US" dirty="0" smtClean="0"/>
+              <a:t>Sample a loaded ROM: 6_sample_prom.xml</a:t>
+            </a:r>
+          </a:p>
+          <a:p>
+            <a:r>
+              <a:rPr lang="en-US" dirty="0" smtClean="0"/>
+              <a:t>Evaluate a ROM: 7_evaluate_rom.xml</a:t>
             </a:r>
           </a:p>
           <a:p>
             <a:pPr lvl="1"/>
             <a:r>
               <a:rPr lang="en-US" dirty="0" smtClean="0"/>
-              <a:t>Sparse grid</a:t>
+              <a:t>Change the number of samples: 20, 100, 200, 1000</a:t>
             </a:r>
           </a:p>
           <a:p>
             <a:pPr lvl="1"/>
             <a:r>
               <a:rPr lang="en-US" dirty="0" smtClean="0"/>
-              <a:t>Cartesian grid</a:t>
-            </a:r>
+              <a:t>Change initial seed</a:t>
+            </a:r>
+            <a:endParaRPr lang="en-US" dirty="0"/>
           </a:p>
           <a:p>
             <a:r>
+              <a:rPr lang="en-US" dirty="0" err="1" smtClean="0"/>
+              <a:t>SciKitLearn</a:t>
+            </a:r>
+            <a:r>
               <a:rPr lang="en-US" dirty="0" smtClean="0"/>
-              <a:t>Extension of the known 1-D interpolation schemes</a:t>
-            </a:r>
+              <a:t> Rom: Linear Regression</a:t>
+            </a:r>
+          </a:p>
+          <a:p>
+            <a:r>
+              <a:rPr lang="en-US" dirty="0" smtClean="0"/>
+              <a:t>Generalized Polynomial Chaos</a:t>
+            </a:r>
+          </a:p>
+          <a:p>
+            <a:pPr lvl="1"/>
+            <a:endParaRPr lang="en-US" dirty="0"/>
           </a:p>
         </p:txBody>
       </p:sp>
@@ -53101,20 +52902,13 @@
     </p:spTree>
     <p:extLst>
       <p:ext uri="{BB962C8B-B14F-4D97-AF65-F5344CB8AC3E}">
-        <p14:creationId xmlns:p14="http://schemas.microsoft.com/office/powerpoint/2010/main" val="1610550268"/>
+        <p14:creationId xmlns:p14="http://schemas.microsoft.com/office/powerpoint/2010/main" val="1380335453"/>
       </p:ext>
     </p:extLst>
   </p:cSld>
   <p:clrMapOvr>
     <a:masterClrMapping/>
   </p:clrMapOvr>
-  <p:timing>
-    <p:tnLst>
-      <p:par>
-        <p:cTn xmlns:p14="http://schemas.microsoft.com/office/powerpoint/2010/main" id="1" dur="indefinite" restart="never" nodeType="tmRoot"/>
-      </p:par>
-    </p:tnLst>
-  </p:timing>
 </p:sld>
 </file>
 
@@ -53157,30 +52951,9 @@
           <a:p>
             <a:pPr lvl="1"/>
             <a:r>
-              <a:rPr lang="en-US" b="0" dirty="0" err="1"/>
-              <a:t>Scikit</a:t>
-            </a:r>
-            <a:r>
-              <a:rPr lang="en-US" b="0" dirty="0" smtClean="0"/>
-              <a:t>-</a:t>
-            </a:r>
-            <a:r>
               <a:rPr lang="en-US" b="0" dirty="0"/>
-              <a:t>L</a:t>
-            </a:r>
-            <a:r>
-              <a:rPr lang="en-US" b="0" dirty="0" smtClean="0"/>
-              <a:t>earn </a:t>
-            </a:r>
-            <a:r>
-              <a:rPr lang="en-US" b="0" dirty="0"/>
-              <a:t>L</a:t>
-            </a:r>
-            <a:r>
-              <a:rPr lang="en-US" b="0" dirty="0" smtClean="0"/>
-              <a:t>ibrary</a:t>
-            </a:r>
-            <a:endParaRPr lang="en-US" b="0" dirty="0"/>
+              <a:t>Generalized Polynomial Chaos</a:t>
+            </a:r>
           </a:p>
         </p:txBody>
       </p:sp>
@@ -53200,206 +52973,74 @@
           <a:lstStyle/>
           <a:p>
             <a:r>
+              <a:rPr lang="en-US" dirty="0" smtClean="0">
+                <a:solidFill>
+                  <a:srgbClr val="3366FF"/>
+                </a:solidFill>
+              </a:rPr>
+              <a:t>Objective</a:t>
+            </a:r>
+            <a:r>
               <a:rPr lang="en-US" dirty="0" smtClean="0"/>
-              <a:t>Available:</a:t>
+              <a:t>: overcome limitations of Monte-Carlo sampling</a:t>
             </a:r>
           </a:p>
           <a:p>
             <a:pPr lvl="1"/>
             <a:r>
-              <a:rPr lang="en-US" dirty="0" smtClean="0">
-                <a:solidFill>
-                  <a:srgbClr val="3366FF"/>
-                </a:solidFill>
-              </a:rPr>
-              <a:t>Classification</a:t>
-            </a:r>
-            <a:r>
               <a:rPr lang="en-US" dirty="0" smtClean="0"/>
-              <a:t>: </a:t>
-            </a:r>
-            <a:r>
-              <a:rPr lang="en-US" dirty="0"/>
-              <a:t>i</a:t>
-            </a:r>
-            <a:r>
-              <a:rPr lang="en-US" dirty="0" smtClean="0"/>
-              <a:t>dentifying </a:t>
-            </a:r>
-            <a:r>
-              <a:rPr lang="en-US" dirty="0"/>
-              <a:t>to which category an object belongs</a:t>
+              <a:t>High number of samples </a:t>
             </a:r>
           </a:p>
           <a:p>
             <a:pPr lvl="1"/>
             <a:r>
-              <a:rPr lang="en-US" dirty="0" smtClean="0">
-                <a:solidFill>
-                  <a:srgbClr val="3366FF"/>
-                </a:solidFill>
-              </a:rPr>
-              <a:t>Regression</a:t>
-            </a:r>
-            <a:r>
               <a:rPr lang="en-US" dirty="0" smtClean="0"/>
-              <a:t>: </a:t>
-            </a:r>
-            <a:r>
-              <a:rPr lang="en-US" dirty="0"/>
-              <a:t>p</a:t>
-            </a:r>
-            <a:r>
-              <a:rPr lang="en-US" dirty="0" smtClean="0"/>
-              <a:t>redicting </a:t>
-            </a:r>
-            <a:r>
-              <a:rPr lang="en-US" dirty="0"/>
-              <a:t>a continuous-valued attribute </a:t>
-            </a:r>
-            <a:endParaRPr lang="en-US" dirty="0" smtClean="0"/>
+              <a:t>Computationally expensive</a:t>
+            </a:r>
           </a:p>
           <a:p>
             <a:pPr lvl="1"/>
+            <a:endParaRPr lang="en-US" dirty="0"/>
+          </a:p>
+          <a:p>
             <a:r>
               <a:rPr lang="en-US" dirty="0" smtClean="0">
                 <a:solidFill>
                   <a:srgbClr val="3366FF"/>
                 </a:solidFill>
               </a:rPr>
-              <a:t>Data clustering</a:t>
+              <a:t>Polynomial representation </a:t>
             </a:r>
             <a:r>
               <a:rPr lang="en-US" dirty="0" smtClean="0"/>
-              <a:t>: grouping similar </a:t>
-            </a:r>
-            <a:r>
-              <a:rPr lang="en-US" dirty="0"/>
-              <a:t>objects into </a:t>
-            </a:r>
-            <a:r>
-              <a:rPr lang="en-US" dirty="0" smtClean="0"/>
-              <a:t>sets</a:t>
+              <a:t>of an output variable</a:t>
             </a:r>
           </a:p>
           <a:p>
             <a:pPr lvl="1"/>
             <a:r>
-              <a:rPr lang="en-US" dirty="0" smtClean="0">
-                <a:solidFill>
-                  <a:srgbClr val="3366FF"/>
-                </a:solidFill>
-              </a:rPr>
-              <a:t>Dimensionality reduction</a:t>
-            </a:r>
-            <a:r>
-              <a:rPr lang="en-US" dirty="0" smtClean="0"/>
-              <a:t>: </a:t>
-            </a:r>
-            <a:r>
               <a:rPr lang="en-US" dirty="0"/>
-              <a:t>r</a:t>
-            </a:r>
-            <a:r>
-              <a:rPr lang="en-US" dirty="0" smtClean="0"/>
-              <a:t>educing </a:t>
-            </a:r>
-            <a:r>
-              <a:rPr lang="en-US" dirty="0"/>
-              <a:t>the number of random </a:t>
-            </a:r>
-            <a:r>
-              <a:rPr lang="en-US" dirty="0" smtClean="0"/>
-              <a:t>variables</a:t>
+              <a:t>Simpler to evaluate</a:t>
             </a:r>
           </a:p>
           <a:p>
             <a:pPr lvl="1"/>
             <a:r>
-              <a:rPr lang="en-US" dirty="0" smtClean="0">
-                <a:solidFill>
-                  <a:srgbClr val="3366FF"/>
-                </a:solidFill>
-              </a:rPr>
-              <a:t>Data pre-processing</a:t>
-            </a:r>
-            <a:r>
-              <a:rPr lang="en-US" dirty="0" smtClean="0"/>
-              <a:t>: </a:t>
-            </a:r>
-            <a:r>
               <a:rPr lang="en-US" dirty="0"/>
-              <a:t>f</a:t>
-            </a:r>
-            <a:r>
-              <a:rPr lang="en-US" dirty="0" smtClean="0"/>
-              <a:t>eature </a:t>
-            </a:r>
-            <a:r>
-              <a:rPr lang="en-US" dirty="0"/>
-              <a:t>extraction and </a:t>
-            </a:r>
-            <a:r>
-              <a:rPr lang="en-US" dirty="0" smtClean="0"/>
-              <a:t>normalization</a:t>
-            </a:r>
-          </a:p>
-          <a:p>
-            <a:pPr marL="457200" lvl="1" indent="0">
-              <a:buNone/>
-            </a:pPr>
-            <a:endParaRPr lang="en-US" dirty="0" smtClean="0"/>
-          </a:p>
-          <a:p>
-            <a:r>
-              <a:rPr lang="en-US" dirty="0" smtClean="0"/>
-              <a:t>Examples:</a:t>
+              <a:t>Easy to get statistical moments</a:t>
             </a:r>
           </a:p>
           <a:p>
             <a:pPr lvl="1"/>
             <a:r>
               <a:rPr lang="en-US" dirty="0"/>
-              <a:t>Linear regression models</a:t>
+              <a:t>Less effort and more accurate than Monte Carlo</a:t>
             </a:r>
           </a:p>
           <a:p>
             <a:pPr lvl="1"/>
-            <a:r>
-              <a:rPr lang="en-US" dirty="0"/>
-              <a:t>Support Vector Machines</a:t>
-            </a:r>
-          </a:p>
-          <a:p>
-            <a:pPr lvl="1"/>
-            <a:r>
-              <a:rPr lang="en-US" dirty="0"/>
-              <a:t>Multi-Class classifiers</a:t>
-            </a:r>
-          </a:p>
-          <a:p>
-            <a:pPr lvl="1"/>
-            <a:r>
-              <a:rPr lang="en-US" dirty="0"/>
-              <a:t>Naïve Bayes</a:t>
-            </a:r>
-          </a:p>
-          <a:p>
-            <a:pPr lvl="1"/>
-            <a:r>
-              <a:rPr lang="en-US" dirty="0"/>
-              <a:t>Neighbors classifiers</a:t>
-            </a:r>
-          </a:p>
-          <a:p>
-            <a:pPr lvl="1"/>
-            <a:r>
-              <a:rPr lang="en-US" dirty="0"/>
-              <a:t>Tree classifiers</a:t>
-            </a:r>
-          </a:p>
-          <a:p>
-            <a:endParaRPr lang="en-US" dirty="0" smtClean="0"/>
+            <a:endParaRPr lang="en-US" dirty="0"/>
           </a:p>
         </p:txBody>
       </p:sp>
@@ -53427,34 +53068,416 @@
           </a:p>
         </p:txBody>
       </p:sp>
-      <p:pic>
-        <p:nvPicPr>
-          <p:cNvPr id="5" name="Picture 4"/>
-          <p:cNvPicPr>
-            <a:picLocks noChangeAspect="1"/>
-          </p:cNvPicPr>
+      <p:graphicFrame>
+        <p:nvGraphicFramePr>
+          <p:cNvPr id="7" name="Object 6"/>
+          <p:cNvGraphicFramePr>
+            <a:graphicFrameLocks noChangeAspect="1"/>
+          </p:cNvGraphicFramePr>
+          <p:nvPr>
+            <p:extLst>
+              <p:ext uri="{D42A27DB-BD31-4B8C-83A1-F6EECF244321}">
+                <p14:modId xmlns:p14="http://schemas.microsoft.com/office/powerpoint/2010/main" val="4057716788"/>
+              </p:ext>
+            </p:extLst>
+          </p:nvPr>
+        </p:nvGraphicFramePr>
+        <p:xfrm>
+          <a:off x="5431929" y="4796439"/>
+          <a:ext cx="3024010" cy="1109751"/>
+        </p:xfrm>
+        <a:graphic>
+          <a:graphicData uri="http://schemas.openxmlformats.org/presentationml/2006/ole">
+            <mc:AlternateContent xmlns:mc="http://schemas.openxmlformats.org/markup-compatibility/2006">
+              <mc:Choice xmlns:v="urn:schemas-microsoft-com:vml" Requires="v">
+                <p:oleObj spid="_x0000_s5595" name="Equation" r:id="rId3" imgW="1244600" imgH="457200" progId="Equation.3">
+                  <p:embed/>
+                </p:oleObj>
+              </mc:Choice>
+              <mc:Fallback>
+                <p:oleObj name="Equation" r:id="rId3" imgW="1244600" imgH="457200" progId="Equation.3">
+                  <p:embed/>
+                  <p:pic>
+                    <p:nvPicPr>
+                      <p:cNvPr id="0" name=""/>
+                      <p:cNvPicPr/>
+                      <p:nvPr/>
+                    </p:nvPicPr>
+                    <p:blipFill>
+                      <a:blip r:embed="rId4"/>
+                      <a:stretch>
+                        <a:fillRect/>
+                      </a:stretch>
+                    </p:blipFill>
+                    <p:spPr>
+                      <a:xfrm>
+                        <a:off x="5431929" y="4796439"/>
+                        <a:ext cx="3024010" cy="1109751"/>
+                      </a:xfrm>
+                      <a:prstGeom prst="rect">
+                        <a:avLst/>
+                      </a:prstGeom>
+                    </p:spPr>
+                  </p:pic>
+                </p:oleObj>
+              </mc:Fallback>
+            </mc:AlternateContent>
+          </a:graphicData>
+        </a:graphic>
+      </p:graphicFrame>
+      <p:graphicFrame>
+        <p:nvGraphicFramePr>
+          <p:cNvPr id="8" name="Object 7"/>
+          <p:cNvGraphicFramePr>
+            <a:graphicFrameLocks noChangeAspect="1"/>
+          </p:cNvGraphicFramePr>
+          <p:nvPr>
+            <p:extLst>
+              <p:ext uri="{D42A27DB-BD31-4B8C-83A1-F6EECF244321}">
+                <p14:modId xmlns:p14="http://schemas.microsoft.com/office/powerpoint/2010/main" val="1607775002"/>
+              </p:ext>
+            </p:extLst>
+          </p:nvPr>
+        </p:nvGraphicFramePr>
+        <p:xfrm>
+          <a:off x="1298711" y="4350543"/>
+          <a:ext cx="3243014" cy="985837"/>
+        </p:xfrm>
+        <a:graphic>
+          <a:graphicData uri="http://schemas.openxmlformats.org/presentationml/2006/ole">
+            <mc:AlternateContent xmlns:mc="http://schemas.openxmlformats.org/markup-compatibility/2006">
+              <mc:Choice xmlns:v="urn:schemas-microsoft-com:vml" Requires="v">
+                <p:oleObj spid="_x0000_s5596" name="Equation" r:id="rId5" imgW="1295400" imgH="393700" progId="Equation.3">
+                  <p:embed/>
+                </p:oleObj>
+              </mc:Choice>
+              <mc:Fallback>
+                <p:oleObj name="Equation" r:id="rId5" imgW="1295400" imgH="393700" progId="Equation.3">
+                  <p:embed/>
+                  <p:pic>
+                    <p:nvPicPr>
+                      <p:cNvPr id="0" name=""/>
+                      <p:cNvPicPr/>
+                      <p:nvPr/>
+                    </p:nvPicPr>
+                    <p:blipFill>
+                      <a:blip r:embed="rId6"/>
+                      <a:stretch>
+                        <a:fillRect/>
+                      </a:stretch>
+                    </p:blipFill>
+                    <p:spPr>
+                      <a:xfrm>
+                        <a:off x="1298711" y="4350543"/>
+                        <a:ext cx="3243014" cy="985837"/>
+                      </a:xfrm>
+                      <a:prstGeom prst="rect">
+                        <a:avLst/>
+                      </a:prstGeom>
+                    </p:spPr>
+                  </p:pic>
+                </p:oleObj>
+              </mc:Fallback>
+            </mc:AlternateContent>
+          </a:graphicData>
+        </a:graphic>
+      </p:graphicFrame>
+      <p:graphicFrame>
+        <p:nvGraphicFramePr>
+          <p:cNvPr id="11" name="Object 10"/>
+          <p:cNvGraphicFramePr>
+            <a:graphicFrameLocks noChangeAspect="1"/>
+          </p:cNvGraphicFramePr>
+          <p:nvPr>
+            <p:extLst>
+              <p:ext uri="{D42A27DB-BD31-4B8C-83A1-F6EECF244321}">
+                <p14:modId xmlns:p14="http://schemas.microsoft.com/office/powerpoint/2010/main" val="3012097170"/>
+              </p:ext>
+            </p:extLst>
+          </p:nvPr>
+        </p:nvGraphicFramePr>
+        <p:xfrm>
+          <a:off x="6035737" y="2822004"/>
+          <a:ext cx="1017587" cy="523875"/>
+        </p:xfrm>
+        <a:graphic>
+          <a:graphicData uri="http://schemas.openxmlformats.org/presentationml/2006/ole">
+            <mc:AlternateContent xmlns:mc="http://schemas.openxmlformats.org/markup-compatibility/2006">
+              <mc:Choice xmlns:v="urn:schemas-microsoft-com:vml" Requires="v">
+                <p:oleObj spid="_x0000_s5597" name="Equation" r:id="rId7" imgW="419100" imgH="215900" progId="Equation.3">
+                  <p:embed/>
+                </p:oleObj>
+              </mc:Choice>
+              <mc:Fallback>
+                <p:oleObj name="Equation" r:id="rId7" imgW="419100" imgH="215900" progId="Equation.3">
+                  <p:embed/>
+                  <p:pic>
+                    <p:nvPicPr>
+                      <p:cNvPr id="0" name=""/>
+                      <p:cNvPicPr/>
+                      <p:nvPr/>
+                    </p:nvPicPr>
+                    <p:blipFill>
+                      <a:blip r:embed="rId8"/>
+                      <a:stretch>
+                        <a:fillRect/>
+                      </a:stretch>
+                    </p:blipFill>
+                    <p:spPr>
+                      <a:xfrm>
+                        <a:off x="6035737" y="2822004"/>
+                        <a:ext cx="1017587" cy="523875"/>
+                      </a:xfrm>
+                      <a:prstGeom prst="rect">
+                        <a:avLst/>
+                      </a:prstGeom>
+                    </p:spPr>
+                  </p:pic>
+                </p:oleObj>
+              </mc:Fallback>
+            </mc:AlternateContent>
+          </a:graphicData>
+        </a:graphic>
+      </p:graphicFrame>
+      <p:sp>
+        <p:nvSpPr>
+          <p:cNvPr id="12" name="Left Brace 11"/>
+          <p:cNvSpPr/>
           <p:nvPr/>
-        </p:nvPicPr>
-        <p:blipFill>
-          <a:blip r:embed="rId3"/>
-          <a:stretch>
-            <a:fillRect/>
-          </a:stretch>
-        </p:blipFill>
+        </p:nvSpPr>
+        <p:spPr bwMode="auto">
+          <a:xfrm rot="16200000">
+            <a:off x="3948188" y="4694905"/>
+            <a:ext cx="172286" cy="918955"/>
+          </a:xfrm>
+          <a:prstGeom prst="leftBrace">
+            <a:avLst>
+              <a:gd name="adj1" fmla="val 22620"/>
+              <a:gd name="adj2" fmla="val 50000"/>
+            </a:avLst>
+          </a:prstGeom>
+          <a:noFill/>
+          <a:ln w="9525" cap="flat" cmpd="sng" algn="ctr">
+            <a:solidFill>
+              <a:schemeClr val="tx1"/>
+            </a:solidFill>
+            <a:prstDash val="solid"/>
+            <a:round/>
+            <a:headEnd type="none" w="med" len="med"/>
+            <a:tailEnd type="none" w="med" len="med"/>
+          </a:ln>
+          <a:effectLst/>
+        </p:spPr>
+        <p:txBody>
+          <a:bodyPr vert="horz" wrap="square" lIns="91440" tIns="45720" rIns="91440" bIns="45720" numCol="1" rtlCol="0" anchor="t" anchorCtr="0" compatLnSpc="1">
+            <a:prstTxWarp prst="textNoShape">
+              <a:avLst/>
+            </a:prstTxWarp>
+          </a:bodyPr>
+          <a:lstStyle/>
+          <a:p>
+            <a:pPr marL="0" marR="0" indent="0" algn="l" defTabSz="914400" rtl="0" eaLnBrk="0" fontAlgn="base" latinLnBrk="0" hangingPunct="0">
+              <a:lnSpc>
+                <a:spcPct val="100000"/>
+              </a:lnSpc>
+              <a:spcBef>
+                <a:spcPct val="0"/>
+              </a:spcBef>
+              <a:spcAft>
+                <a:spcPct val="0"/>
+              </a:spcAft>
+              <a:buClrTx/>
+              <a:buSzTx/>
+              <a:buFontTx/>
+              <a:buNone/>
+              <a:tabLst/>
+            </a:pPr>
+            <a:endParaRPr kumimoji="0" lang="en-US" sz="2400" b="0" i="0" u="none" strike="noStrike" cap="none" normalizeH="0" baseline="0" smtClean="0">
+              <a:ln>
+                <a:noFill/>
+              </a:ln>
+              <a:solidFill>
+                <a:schemeClr val="tx1"/>
+              </a:solidFill>
+              <a:effectLst/>
+              <a:latin typeface="Times New Roman" pitchFamily="18" charset="0"/>
+            </a:endParaRPr>
+          </a:p>
+        </p:txBody>
+      </p:sp>
+      <p:cxnSp>
+        <p:nvCxnSpPr>
+          <p:cNvPr id="14" name="Elbow Connector 13"/>
+          <p:cNvCxnSpPr/>
+          <p:nvPr/>
+        </p:nvCxnSpPr>
+        <p:spPr bwMode="auto">
+          <a:xfrm>
+            <a:off x="4037378" y="5288454"/>
+            <a:ext cx="1370591" cy="47926"/>
+          </a:xfrm>
+          <a:prstGeom prst="bentConnector3">
+            <a:avLst>
+              <a:gd name="adj1" fmla="val 176"/>
+            </a:avLst>
+          </a:prstGeom>
+          <a:solidFill>
+            <a:schemeClr val="accent1"/>
+          </a:solidFill>
+          <a:ln w="9525" cap="flat" cmpd="sng" algn="ctr">
+            <a:solidFill>
+              <a:schemeClr val="tx1"/>
+            </a:solidFill>
+            <a:prstDash val="solid"/>
+            <a:round/>
+            <a:headEnd type="none" w="med" len="med"/>
+            <a:tailEnd type="arrow"/>
+          </a:ln>
+          <a:effectLst/>
+        </p:spPr>
+      </p:cxnSp>
+      <p:sp>
+        <p:nvSpPr>
+          <p:cNvPr id="18" name="Left Brace 17"/>
+          <p:cNvSpPr/>
+          <p:nvPr/>
+        </p:nvSpPr>
+        <p:spPr bwMode="auto">
+          <a:xfrm rot="16200000">
+            <a:off x="2853731" y="5204423"/>
+            <a:ext cx="172286" cy="462526"/>
+          </a:xfrm>
+          <a:prstGeom prst="leftBrace">
+            <a:avLst>
+              <a:gd name="adj1" fmla="val 22620"/>
+              <a:gd name="adj2" fmla="val 50000"/>
+            </a:avLst>
+          </a:prstGeom>
+          <a:noFill/>
+          <a:ln w="9525" cap="flat" cmpd="sng" algn="ctr">
+            <a:solidFill>
+              <a:schemeClr val="tx1"/>
+            </a:solidFill>
+            <a:prstDash val="solid"/>
+            <a:round/>
+            <a:headEnd type="none" w="med" len="med"/>
+            <a:tailEnd type="none" w="med" len="med"/>
+          </a:ln>
+          <a:effectLst/>
+        </p:spPr>
+        <p:txBody>
+          <a:bodyPr vert="horz" wrap="square" lIns="91440" tIns="45720" rIns="91440" bIns="45720" numCol="1" rtlCol="0" anchor="t" anchorCtr="0" compatLnSpc="1">
+            <a:prstTxWarp prst="textNoShape">
+              <a:avLst/>
+            </a:prstTxWarp>
+          </a:bodyPr>
+          <a:lstStyle/>
+          <a:p>
+            <a:pPr marL="0" marR="0" indent="0" algn="l" defTabSz="914400" rtl="0" eaLnBrk="0" fontAlgn="base" latinLnBrk="0" hangingPunct="0">
+              <a:lnSpc>
+                <a:spcPct val="100000"/>
+              </a:lnSpc>
+              <a:spcBef>
+                <a:spcPct val="0"/>
+              </a:spcBef>
+              <a:spcAft>
+                <a:spcPct val="0"/>
+              </a:spcAft>
+              <a:buClrTx/>
+              <a:buSzTx/>
+              <a:buFontTx/>
+              <a:buNone/>
+              <a:tabLst/>
+            </a:pPr>
+            <a:endParaRPr kumimoji="0" lang="en-US" sz="2400" b="0" i="0" u="none" strike="noStrike" cap="none" normalizeH="0" baseline="0" smtClean="0">
+              <a:ln>
+                <a:noFill/>
+              </a:ln>
+              <a:solidFill>
+                <a:schemeClr val="tx1"/>
+              </a:solidFill>
+              <a:effectLst/>
+              <a:latin typeface="Times New Roman" pitchFamily="18" charset="0"/>
+            </a:endParaRPr>
+          </a:p>
+        </p:txBody>
+      </p:sp>
+      <p:cxnSp>
+        <p:nvCxnSpPr>
+          <p:cNvPr id="19" name="Elbow Connector 18"/>
+          <p:cNvCxnSpPr/>
+          <p:nvPr/>
+        </p:nvCxnSpPr>
+        <p:spPr bwMode="auto">
+          <a:xfrm>
+            <a:off x="2949457" y="5568044"/>
+            <a:ext cx="932175" cy="650435"/>
+          </a:xfrm>
+          <a:prstGeom prst="bentConnector3">
+            <a:avLst>
+              <a:gd name="adj1" fmla="val -123"/>
+            </a:avLst>
+          </a:prstGeom>
+          <a:solidFill>
+            <a:schemeClr val="accent1"/>
+          </a:solidFill>
+          <a:ln w="9525" cap="flat" cmpd="sng" algn="ctr">
+            <a:solidFill>
+              <a:schemeClr val="tx1"/>
+            </a:solidFill>
+            <a:prstDash val="solid"/>
+            <a:round/>
+            <a:headEnd type="none" w="med" len="med"/>
+            <a:tailEnd type="arrow"/>
+          </a:ln>
+          <a:effectLst/>
+        </p:spPr>
+      </p:cxnSp>
+      <p:sp>
+        <p:nvSpPr>
+          <p:cNvPr id="23" name="Rectangle 22"/>
+          <p:cNvSpPr/>
+          <p:nvPr/>
+        </p:nvSpPr>
         <p:spPr>
           <a:xfrm>
-            <a:off x="4994332" y="5598417"/>
-            <a:ext cx="3529327" cy="1259583"/>
+            <a:off x="3900752" y="5904578"/>
+            <a:ext cx="4572000" cy="707886"/>
           </a:xfrm>
           <a:prstGeom prst="rect">
             <a:avLst/>
           </a:prstGeom>
         </p:spPr>
-      </p:pic>
+        <p:txBody>
+          <a:bodyPr>
+            <a:spAutoFit/>
+          </a:bodyPr>
+          <a:lstStyle/>
+          <a:p>
+            <a:r>
+              <a:rPr lang="en-US" sz="2000" dirty="0">
+                <a:latin typeface="+mn-lt"/>
+              </a:rPr>
+              <a:t>index set of all desired polynomial orders up to order </a:t>
+            </a:r>
+            <a:r>
+              <a:rPr lang="en-US" sz="2000" i="1" dirty="0" smtClean="0">
+                <a:latin typeface="Times New Roman"/>
+                <a:cs typeface="Times New Roman"/>
+              </a:rPr>
+              <a:t>L</a:t>
+            </a:r>
+            <a:endParaRPr lang="en-US" sz="2000" i="1" dirty="0">
+              <a:latin typeface="Times New Roman"/>
+              <a:cs typeface="Times New Roman"/>
+            </a:endParaRPr>
+          </a:p>
+        </p:txBody>
+      </p:sp>
     </p:spTree>
     <p:extLst>
       <p:ext uri="{BB962C8B-B14F-4D97-AF65-F5344CB8AC3E}">
-        <p14:creationId xmlns:p14="http://schemas.microsoft.com/office/powerpoint/2010/main" val="2916341349"/>
+        <p14:creationId xmlns:p14="http://schemas.microsoft.com/office/powerpoint/2010/main" val="1971946545"/>
       </p:ext>
     </p:extLst>
   </p:cSld>
@@ -53693,7 +53716,7 @@
           <a:graphicData uri="http://schemas.openxmlformats.org/presentationml/2006/ole">
             <mc:AlternateContent xmlns:mc="http://schemas.openxmlformats.org/markup-compatibility/2006">
               <mc:Choice xmlns:v="urn:schemas-microsoft-com:vml" Requires="v">
-                <p:oleObj spid="_x0000_s7722" name="Equation" r:id="rId4" imgW="635000" imgH="241300" progId="Equation.3">
+                <p:oleObj spid="_x0000_s7758" name="Equation" r:id="rId4" imgW="635000" imgH="241300" progId="Equation.3">
                   <p:embed/>
                 </p:oleObj>
               </mc:Choice>
@@ -53750,7 +53773,7 @@
           <a:graphicData uri="http://schemas.openxmlformats.org/presentationml/2006/ole">
             <mc:AlternateContent xmlns:mc="http://schemas.openxmlformats.org/markup-compatibility/2006">
               <mc:Choice xmlns:v="urn:schemas-microsoft-com:vml" Requires="v">
-                <p:oleObj spid="_x0000_s7723" name="Equation" r:id="rId6" imgW="609600" imgH="177800" progId="Equation.3">
+                <p:oleObj spid="_x0000_s7759" name="Equation" r:id="rId6" imgW="609600" imgH="177800" progId="Equation.3">
                   <p:embed/>
                 </p:oleObj>
               </mc:Choice>
@@ -53964,7 +53987,7 @@
           <a:graphicData uri="http://schemas.openxmlformats.org/presentationml/2006/ole">
             <mc:AlternateContent xmlns:mc="http://schemas.openxmlformats.org/markup-compatibility/2006">
               <mc:Choice xmlns:v="urn:schemas-microsoft-com:vml" Requires="v">
-                <p:oleObj spid="_x0000_s7724" name="Equation" r:id="rId8" imgW="1727200" imgH="241300" progId="Equation.3">
+                <p:oleObj spid="_x0000_s7760" name="Equation" r:id="rId8" imgW="1727200" imgH="241300" progId="Equation.3">
                   <p:embed/>
                 </p:oleObj>
               </mc:Choice>
@@ -54434,7 +54457,7 @@
           <a:graphicData uri="http://schemas.openxmlformats.org/presentationml/2006/ole">
             <mc:AlternateContent xmlns:mc="http://schemas.openxmlformats.org/markup-compatibility/2006">
               <mc:Choice xmlns:v="urn:schemas-microsoft-com:vml" Requires="v">
-                <p:oleObj spid="_x0000_s7725" name="Equation" r:id="rId10" imgW="660400" imgH="241300" progId="Equation.3">
+                <p:oleObj spid="_x0000_s7761" name="Equation" r:id="rId10" imgW="660400" imgH="241300" progId="Equation.3">
                   <p:embed/>
                 </p:oleObj>
               </mc:Choice>
@@ -54529,7 +54552,7 @@
           <a:graphicData uri="http://schemas.openxmlformats.org/presentationml/2006/ole">
             <mc:AlternateContent xmlns:mc="http://schemas.openxmlformats.org/markup-compatibility/2006">
               <mc:Choice xmlns:v="urn:schemas-microsoft-com:vml" Requires="v">
-                <p:oleObj spid="_x0000_s7726" name="Equation" r:id="rId12" imgW="342900" imgH="203200" progId="Equation.3">
+                <p:oleObj spid="_x0000_s7762" name="Equation" r:id="rId12" imgW="342900" imgH="203200" progId="Equation.3">
                   <p:embed/>
                 </p:oleObj>
               </mc:Choice>
@@ -54784,7 +54807,7 @@
           <a:graphicData uri="http://schemas.openxmlformats.org/presentationml/2006/ole">
             <mc:AlternateContent xmlns:mc="http://schemas.openxmlformats.org/markup-compatibility/2006">
               <mc:Choice xmlns:v="urn:schemas-microsoft-com:vml" Requires="v">
-                <p:oleObj spid="_x0000_s7727" name="Equation" r:id="rId14" imgW="342900" imgH="203200" progId="Equation.3">
+                <p:oleObj spid="_x0000_s7763" name="Equation" r:id="rId14" imgW="342900" imgH="203200" progId="Equation.3">
                   <p:embed/>
                 </p:oleObj>
               </mc:Choice>
@@ -54906,1011 +54929,6 @@
 </p:sld>
 </file>
 
-<file path=ppt/slides/slide30.xml><?xml version="1.0" encoding="utf-8"?>
-<p:sld xmlns:a="http://schemas.openxmlformats.org/drawingml/2006/main" xmlns:r="http://schemas.openxmlformats.org/officeDocument/2006/relationships" xmlns:p="http://schemas.openxmlformats.org/presentationml/2006/main">
-  <p:cSld>
-    <p:spTree>
-      <p:nvGrpSpPr>
-        <p:cNvPr id="1" name=""/>
-        <p:cNvGrpSpPr/>
-        <p:nvPr/>
-      </p:nvGrpSpPr>
-      <p:grpSpPr>
-        <a:xfrm>
-          <a:off x="0" y="0"/>
-          <a:ext cx="0" cy="0"/>
-          <a:chOff x="0" y="0"/>
-          <a:chExt cx="0" cy="0"/>
-        </a:xfrm>
-      </p:grpSpPr>
-      <p:sp>
-        <p:nvSpPr>
-          <p:cNvPr id="2" name="Title 1"/>
-          <p:cNvSpPr>
-            <a:spLocks noGrp="1"/>
-          </p:cNvSpPr>
-          <p:nvPr>
-            <p:ph type="title"/>
-          </p:nvPr>
-        </p:nvSpPr>
-        <p:spPr>
-          <a:xfrm>
-            <a:off x="455613" y="1004888"/>
-            <a:ext cx="8231187" cy="377026"/>
-          </a:xfrm>
-        </p:spPr>
-        <p:txBody>
-          <a:bodyPr/>
-          <a:lstStyle/>
-          <a:p>
-            <a:pPr lvl="1"/>
-            <a:r>
-              <a:rPr lang="en-US" b="0" dirty="0" err="1"/>
-              <a:t>Scikit</a:t>
-            </a:r>
-            <a:r>
-              <a:rPr lang="en-US" b="0" dirty="0" smtClean="0"/>
-              <a:t>-</a:t>
-            </a:r>
-            <a:r>
-              <a:rPr lang="en-US" b="0" dirty="0"/>
-              <a:t>L</a:t>
-            </a:r>
-            <a:r>
-              <a:rPr lang="en-US" b="0" dirty="0" smtClean="0"/>
-              <a:t>earn </a:t>
-            </a:r>
-            <a:r>
-              <a:rPr lang="en-US" b="0" dirty="0"/>
-              <a:t>L</a:t>
-            </a:r>
-            <a:r>
-              <a:rPr lang="en-US" b="0" dirty="0" smtClean="0"/>
-              <a:t>ibrary</a:t>
-            </a:r>
-            <a:endParaRPr lang="en-US" b="0" dirty="0"/>
-          </a:p>
-        </p:txBody>
-      </p:sp>
-      <p:sp>
-        <p:nvSpPr>
-          <p:cNvPr id="3" name="Content Placeholder 2"/>
-          <p:cNvSpPr>
-            <a:spLocks noGrp="1"/>
-          </p:cNvSpPr>
-          <p:nvPr>
-            <p:ph idx="1"/>
-          </p:nvPr>
-        </p:nvSpPr>
-        <p:spPr>
-          <a:xfrm>
-            <a:off x="455614" y="1598613"/>
-            <a:ext cx="5259071" cy="4524375"/>
-          </a:xfrm>
-        </p:spPr>
-        <p:txBody>
-          <a:bodyPr/>
-          <a:lstStyle/>
-          <a:p>
-            <a:pPr marL="0" lvl="1" indent="0">
-              <a:buNone/>
-            </a:pPr>
-            <a:r>
-              <a:rPr lang="en-US" dirty="0"/>
-              <a:t>Starting point: set of data </a:t>
-            </a:r>
-            <a:r>
-              <a:rPr lang="en-US" dirty="0" smtClean="0"/>
-              <a:t>points</a:t>
-            </a:r>
-            <a:endParaRPr lang="en-US" dirty="0"/>
-          </a:p>
-          <a:p>
-            <a:pPr marL="0" lvl="1" indent="0" algn="ctr">
-              <a:buNone/>
-            </a:pPr>
-            <a:r>
-              <a:rPr lang="en-US" dirty="0" smtClean="0"/>
-              <a:t>[</a:t>
-            </a:r>
-            <a:r>
-              <a:rPr lang="en-US" dirty="0"/>
-              <a:t>features</a:t>
-            </a:r>
-            <a:r>
-              <a:rPr lang="en-US" dirty="0" smtClean="0"/>
-              <a:t>]</a:t>
-            </a:r>
-            <a:r>
-              <a:rPr lang="en-US" baseline="-25000" dirty="0"/>
-              <a:t>i</a:t>
-            </a:r>
-            <a:endParaRPr lang="en-US" baseline="-25000" dirty="0" smtClean="0"/>
-          </a:p>
-          <a:p>
-            <a:pPr marL="457200" lvl="1" indent="0">
-              <a:buNone/>
-            </a:pPr>
-            <a:endParaRPr lang="en-US" dirty="0" smtClean="0"/>
-          </a:p>
-          <a:p>
-            <a:r>
-              <a:rPr lang="en-US" dirty="0" smtClean="0">
-                <a:solidFill>
-                  <a:srgbClr val="3366FF"/>
-                </a:solidFill>
-              </a:rPr>
-              <a:t>Cardinality reduction</a:t>
-            </a:r>
-          </a:p>
-          <a:p>
-            <a:pPr lvl="1"/>
-            <a:r>
-              <a:rPr lang="en-US" dirty="0" smtClean="0"/>
-              <a:t>Objective</a:t>
-            </a:r>
-            <a:r>
-              <a:rPr lang="en-US" dirty="0"/>
-              <a:t>: </a:t>
-            </a:r>
-            <a:r>
-              <a:rPr lang="en-US" dirty="0" smtClean="0"/>
-              <a:t>identify the most relevant features that keep data points unique</a:t>
-            </a:r>
-          </a:p>
-          <a:p>
-            <a:pPr lvl="1"/>
-            <a:r>
-              <a:rPr lang="en-US" dirty="0" smtClean="0"/>
-              <a:t>Outcome: Location of the points on the reduced space (e.g., line)</a:t>
-            </a:r>
-            <a:endParaRPr lang="en-US" dirty="0"/>
-          </a:p>
-          <a:p>
-            <a:endParaRPr lang="en-US" dirty="0" smtClean="0"/>
-          </a:p>
-          <a:p>
-            <a:r>
-              <a:rPr lang="en-US" dirty="0" smtClean="0">
-                <a:solidFill>
-                  <a:srgbClr val="3366FF"/>
-                </a:solidFill>
-              </a:rPr>
-              <a:t>Regression</a:t>
-            </a:r>
-          </a:p>
-          <a:p>
-            <a:pPr lvl="1"/>
-            <a:r>
-              <a:rPr lang="en-US" dirty="0" smtClean="0"/>
-              <a:t>Objective</a:t>
-            </a:r>
-            <a:r>
-              <a:rPr lang="en-US" dirty="0"/>
-              <a:t>: </a:t>
-            </a:r>
-            <a:r>
-              <a:rPr lang="en-US" dirty="0" smtClean="0"/>
-              <a:t>estimate the </a:t>
-            </a:r>
-            <a:r>
-              <a:rPr lang="en-US" dirty="0"/>
-              <a:t>relationships among </a:t>
-            </a:r>
-            <a:r>
-              <a:rPr lang="en-US" dirty="0" smtClean="0"/>
-              <a:t>variables via a statistical process</a:t>
-            </a:r>
-          </a:p>
-          <a:p>
-            <a:pPr lvl="1"/>
-            <a:r>
-              <a:rPr lang="en-US" dirty="0" smtClean="0"/>
-              <a:t>Outcome: coefficients of the reduced space (e.g., </a:t>
-            </a:r>
-            <a:r>
-              <a:rPr lang="en-US" i="1" dirty="0" smtClean="0"/>
-              <a:t>m</a:t>
-            </a:r>
-            <a:r>
-              <a:rPr lang="en-US" dirty="0" smtClean="0"/>
-              <a:t> and </a:t>
-            </a:r>
-            <a:r>
-              <a:rPr lang="en-US" i="1" dirty="0" smtClean="0"/>
-              <a:t>c</a:t>
-            </a:r>
-            <a:r>
-              <a:rPr lang="en-US" dirty="0" smtClean="0"/>
-              <a:t> for linear interpolator                    )</a:t>
-            </a:r>
-          </a:p>
-        </p:txBody>
-      </p:sp>
-      <p:sp>
-        <p:nvSpPr>
-          <p:cNvPr id="4" name="Slide Number Placeholder 3"/>
-          <p:cNvSpPr>
-            <a:spLocks noGrp="1"/>
-          </p:cNvSpPr>
-          <p:nvPr>
-            <p:ph type="sldNum" sz="quarter" idx="11"/>
-          </p:nvPr>
-        </p:nvSpPr>
-        <p:spPr/>
-        <p:txBody>
-          <a:bodyPr/>
-          <a:lstStyle/>
-          <a:p>
-            <a:fld id="{4B4332F1-BAE3-4172-AA6D-91F763B329EF}" type="slidenum">
-              <a:rPr lang="en-US" smtClean="0"/>
-              <a:pPr/>
-              <a:t>30</a:t>
-            </a:fld>
-            <a:endParaRPr lang="en-US"/>
-          </a:p>
-        </p:txBody>
-      </p:sp>
-      <p:pic>
-        <p:nvPicPr>
-          <p:cNvPr id="5" name="Picture 4"/>
-          <p:cNvPicPr>
-            <a:picLocks noChangeAspect="1"/>
-          </p:cNvPicPr>
-          <p:nvPr/>
-        </p:nvPicPr>
-        <p:blipFill>
-          <a:blip r:embed="rId4"/>
-          <a:stretch>
-            <a:fillRect/>
-          </a:stretch>
-        </p:blipFill>
-        <p:spPr>
-          <a:xfrm>
-            <a:off x="4994332" y="5598417"/>
-            <a:ext cx="3529327" cy="1259583"/>
-          </a:xfrm>
-          <a:prstGeom prst="rect">
-            <a:avLst/>
-          </a:prstGeom>
-        </p:spPr>
-      </p:pic>
-      <p:sp>
-        <p:nvSpPr>
-          <p:cNvPr id="18" name="TextBox 17"/>
-          <p:cNvSpPr txBox="1"/>
-          <p:nvPr/>
-        </p:nvSpPr>
-        <p:spPr>
-          <a:xfrm>
-            <a:off x="5837847" y="4374603"/>
-            <a:ext cx="3306153" cy="307777"/>
-          </a:xfrm>
-          <a:prstGeom prst="rect">
-            <a:avLst/>
-          </a:prstGeom>
-          <a:noFill/>
-        </p:spPr>
-        <p:txBody>
-          <a:bodyPr wrap="square" rtlCol="0">
-            <a:spAutoFit/>
-          </a:bodyPr>
-          <a:lstStyle/>
-          <a:p>
-            <a:pPr algn="ctr"/>
-            <a:r>
-              <a:rPr lang="en-US" sz="1400" dirty="0" smtClean="0">
-                <a:latin typeface="+mn-lt"/>
-              </a:rPr>
-              <a:t>Source: </a:t>
-            </a:r>
-            <a:r>
-              <a:rPr lang="en-US" sz="1400" dirty="0" err="1" smtClean="0">
-                <a:latin typeface="+mn-lt"/>
-              </a:rPr>
-              <a:t>scikit</a:t>
-            </a:r>
-            <a:r>
-              <a:rPr lang="en-US" sz="1400" dirty="0" err="1">
-                <a:latin typeface="+mn-lt"/>
-              </a:rPr>
-              <a:t>-learn.org</a:t>
-            </a:r>
-            <a:r>
-              <a:rPr lang="en-US" sz="1400" dirty="0" smtClean="0">
-                <a:latin typeface="+mn-lt"/>
-              </a:rPr>
-              <a:t> </a:t>
-            </a:r>
-            <a:endParaRPr lang="en-US" sz="1400" dirty="0">
-              <a:latin typeface="+mn-lt"/>
-            </a:endParaRPr>
-          </a:p>
-        </p:txBody>
-      </p:sp>
-      <p:pic>
-        <p:nvPicPr>
-          <p:cNvPr id="19" name="Picture 18"/>
-          <p:cNvPicPr>
-            <a:picLocks noChangeAspect="1"/>
-          </p:cNvPicPr>
-          <p:nvPr/>
-        </p:nvPicPr>
-        <p:blipFill>
-          <a:blip r:embed="rId5"/>
-          <a:stretch>
-            <a:fillRect/>
-          </a:stretch>
-        </p:blipFill>
-        <p:spPr>
-          <a:xfrm>
-            <a:off x="5837847" y="1905069"/>
-            <a:ext cx="3306153" cy="2479615"/>
-          </a:xfrm>
-          <a:prstGeom prst="rect">
-            <a:avLst/>
-          </a:prstGeom>
-        </p:spPr>
-      </p:pic>
-      <p:graphicFrame>
-        <p:nvGraphicFramePr>
-          <p:cNvPr id="8" name="Object 7"/>
-          <p:cNvGraphicFramePr>
-            <a:graphicFrameLocks noChangeAspect="1"/>
-          </p:cNvGraphicFramePr>
-          <p:nvPr>
-            <p:extLst>
-              <p:ext uri="{D42A27DB-BD31-4B8C-83A1-F6EECF244321}">
-                <p14:modId xmlns:p14="http://schemas.microsoft.com/office/powerpoint/2010/main" val="1494862603"/>
-              </p:ext>
-            </p:extLst>
-          </p:nvPr>
-        </p:nvGraphicFramePr>
-        <p:xfrm>
-          <a:off x="2463813" y="5962815"/>
-          <a:ext cx="1336161" cy="340590"/>
-        </p:xfrm>
-        <a:graphic>
-          <a:graphicData uri="http://schemas.openxmlformats.org/presentationml/2006/ole">
-            <mc:AlternateContent xmlns:mc="http://schemas.openxmlformats.org/markup-compatibility/2006">
-              <mc:Choice xmlns:v="urn:schemas-microsoft-com:vml" Requires="v">
-                <p:oleObj spid="_x0000_s1073" name="Equation" r:id="rId6" imgW="647700" imgH="165100" progId="Equation.3">
-                  <p:embed/>
-                </p:oleObj>
-              </mc:Choice>
-              <mc:Fallback>
-                <p:oleObj name="Equation" r:id="rId6" imgW="647700" imgH="165100" progId="Equation.3">
-                  <p:embed/>
-                  <p:pic>
-                    <p:nvPicPr>
-                      <p:cNvPr id="0" name=""/>
-                      <p:cNvPicPr/>
-                      <p:nvPr/>
-                    </p:nvPicPr>
-                    <p:blipFill>
-                      <a:blip r:embed="rId7"/>
-                      <a:stretch>
-                        <a:fillRect/>
-                      </a:stretch>
-                    </p:blipFill>
-                    <p:spPr>
-                      <a:xfrm>
-                        <a:off x="2463813" y="5962815"/>
-                        <a:ext cx="1336161" cy="340590"/>
-                      </a:xfrm>
-                      <a:prstGeom prst="rect">
-                        <a:avLst/>
-                      </a:prstGeom>
-                    </p:spPr>
-                  </p:pic>
-                </p:oleObj>
-              </mc:Fallback>
-            </mc:AlternateContent>
-          </a:graphicData>
-        </a:graphic>
-      </p:graphicFrame>
-    </p:spTree>
-    <p:extLst>
-      <p:ext uri="{BB962C8B-B14F-4D97-AF65-F5344CB8AC3E}">
-        <p14:creationId xmlns:p14="http://schemas.microsoft.com/office/powerpoint/2010/main" val="2433643847"/>
-      </p:ext>
-    </p:extLst>
-  </p:cSld>
-  <p:clrMapOvr>
-    <a:masterClrMapping/>
-  </p:clrMapOvr>
-  <p:timing>
-    <p:tnLst>
-      <p:par>
-        <p:cTn xmlns:p14="http://schemas.microsoft.com/office/powerpoint/2010/main" id="1" dur="indefinite" restart="never" nodeType="tmRoot"/>
-      </p:par>
-    </p:tnLst>
-  </p:timing>
-</p:sld>
-</file>
-
-<file path=ppt/slides/slide31.xml><?xml version="1.0" encoding="utf-8"?>
-<p:sld xmlns:a="http://schemas.openxmlformats.org/drawingml/2006/main" xmlns:r="http://schemas.openxmlformats.org/officeDocument/2006/relationships" xmlns:p="http://schemas.openxmlformats.org/presentationml/2006/main">
-  <p:cSld>
-    <p:spTree>
-      <p:nvGrpSpPr>
-        <p:cNvPr id="1" name=""/>
-        <p:cNvGrpSpPr/>
-        <p:nvPr/>
-      </p:nvGrpSpPr>
-      <p:grpSpPr>
-        <a:xfrm>
-          <a:off x="0" y="0"/>
-          <a:ext cx="0" cy="0"/>
-          <a:chOff x="0" y="0"/>
-          <a:chExt cx="0" cy="0"/>
-        </a:xfrm>
-      </p:grpSpPr>
-      <p:sp>
-        <p:nvSpPr>
-          <p:cNvPr id="2" name="Title 1"/>
-          <p:cNvSpPr>
-            <a:spLocks noGrp="1"/>
-          </p:cNvSpPr>
-          <p:nvPr>
-            <p:ph type="title"/>
-          </p:nvPr>
-        </p:nvSpPr>
-        <p:spPr>
-          <a:xfrm>
-            <a:off x="455613" y="1004888"/>
-            <a:ext cx="8231187" cy="377026"/>
-          </a:xfrm>
-        </p:spPr>
-        <p:txBody>
-          <a:bodyPr/>
-          <a:lstStyle/>
-          <a:p>
-            <a:pPr lvl="1"/>
-            <a:r>
-              <a:rPr lang="en-US" b="0" dirty="0"/>
-              <a:t>Generalized Polynomial Chaos</a:t>
-            </a:r>
-          </a:p>
-        </p:txBody>
-      </p:sp>
-      <p:sp>
-        <p:nvSpPr>
-          <p:cNvPr id="3" name="Content Placeholder 2"/>
-          <p:cNvSpPr>
-            <a:spLocks noGrp="1"/>
-          </p:cNvSpPr>
-          <p:nvPr>
-            <p:ph idx="1"/>
-          </p:nvPr>
-        </p:nvSpPr>
-        <p:spPr/>
-        <p:txBody>
-          <a:bodyPr/>
-          <a:lstStyle/>
-          <a:p>
-            <a:r>
-              <a:rPr lang="en-US" dirty="0" smtClean="0">
-                <a:solidFill>
-                  <a:srgbClr val="3366FF"/>
-                </a:solidFill>
-              </a:rPr>
-              <a:t>Objective</a:t>
-            </a:r>
-            <a:r>
-              <a:rPr lang="en-US" dirty="0" smtClean="0"/>
-              <a:t>: overcome limitations of Monte-Carlo sampling</a:t>
-            </a:r>
-          </a:p>
-          <a:p>
-            <a:pPr lvl="1"/>
-            <a:r>
-              <a:rPr lang="en-US" dirty="0" smtClean="0"/>
-              <a:t>High number of samples </a:t>
-            </a:r>
-          </a:p>
-          <a:p>
-            <a:pPr lvl="1"/>
-            <a:r>
-              <a:rPr lang="en-US" dirty="0" smtClean="0"/>
-              <a:t>Computationally expensive</a:t>
-            </a:r>
-          </a:p>
-          <a:p>
-            <a:pPr lvl="1"/>
-            <a:endParaRPr lang="en-US" dirty="0"/>
-          </a:p>
-          <a:p>
-            <a:r>
-              <a:rPr lang="en-US" dirty="0" smtClean="0">
-                <a:solidFill>
-                  <a:srgbClr val="3366FF"/>
-                </a:solidFill>
-              </a:rPr>
-              <a:t>Polynomial representation </a:t>
-            </a:r>
-            <a:r>
-              <a:rPr lang="en-US" dirty="0" smtClean="0"/>
-              <a:t>of an output variable</a:t>
-            </a:r>
-          </a:p>
-          <a:p>
-            <a:pPr lvl="1"/>
-            <a:r>
-              <a:rPr lang="en-US" dirty="0"/>
-              <a:t>Simpler to evaluate</a:t>
-            </a:r>
-          </a:p>
-          <a:p>
-            <a:pPr lvl="1"/>
-            <a:r>
-              <a:rPr lang="en-US" dirty="0"/>
-              <a:t>Easy to get statistical moments</a:t>
-            </a:r>
-          </a:p>
-          <a:p>
-            <a:pPr lvl="1"/>
-            <a:r>
-              <a:rPr lang="en-US" dirty="0"/>
-              <a:t>Less effort and more accurate than Monte Carlo</a:t>
-            </a:r>
-          </a:p>
-          <a:p>
-            <a:pPr lvl="1"/>
-            <a:endParaRPr lang="en-US" dirty="0"/>
-          </a:p>
-        </p:txBody>
-      </p:sp>
-      <p:sp>
-        <p:nvSpPr>
-          <p:cNvPr id="4" name="Slide Number Placeholder 3"/>
-          <p:cNvSpPr>
-            <a:spLocks noGrp="1"/>
-          </p:cNvSpPr>
-          <p:nvPr>
-            <p:ph type="sldNum" sz="quarter" idx="11"/>
-          </p:nvPr>
-        </p:nvSpPr>
-        <p:spPr/>
-        <p:txBody>
-          <a:bodyPr/>
-          <a:lstStyle/>
-          <a:p>
-            <a:fld id="{4B4332F1-BAE3-4172-AA6D-91F763B329EF}" type="slidenum">
-              <a:rPr lang="en-US" smtClean="0"/>
-              <a:pPr/>
-              <a:t>31</a:t>
-            </a:fld>
-            <a:endParaRPr lang="en-US"/>
-          </a:p>
-        </p:txBody>
-      </p:sp>
-      <p:graphicFrame>
-        <p:nvGraphicFramePr>
-          <p:cNvPr id="7" name="Object 6"/>
-          <p:cNvGraphicFramePr>
-            <a:graphicFrameLocks noChangeAspect="1"/>
-          </p:cNvGraphicFramePr>
-          <p:nvPr>
-            <p:extLst>
-              <p:ext uri="{D42A27DB-BD31-4B8C-83A1-F6EECF244321}">
-                <p14:modId xmlns:p14="http://schemas.microsoft.com/office/powerpoint/2010/main" val="4057716788"/>
-              </p:ext>
-            </p:extLst>
-          </p:nvPr>
-        </p:nvGraphicFramePr>
-        <p:xfrm>
-          <a:off x="5431929" y="4796439"/>
-          <a:ext cx="3024010" cy="1109751"/>
-        </p:xfrm>
-        <a:graphic>
-          <a:graphicData uri="http://schemas.openxmlformats.org/presentationml/2006/ole">
-            <mc:AlternateContent xmlns:mc="http://schemas.openxmlformats.org/markup-compatibility/2006">
-              <mc:Choice xmlns:v="urn:schemas-microsoft-com:vml" Requires="v">
-                <p:oleObj spid="_x0000_s5577" name="Equation" r:id="rId3" imgW="1244600" imgH="457200" progId="Equation.3">
-                  <p:embed/>
-                </p:oleObj>
-              </mc:Choice>
-              <mc:Fallback>
-                <p:oleObj name="Equation" r:id="rId3" imgW="1244600" imgH="457200" progId="Equation.3">
-                  <p:embed/>
-                  <p:pic>
-                    <p:nvPicPr>
-                      <p:cNvPr id="0" name=""/>
-                      <p:cNvPicPr/>
-                      <p:nvPr/>
-                    </p:nvPicPr>
-                    <p:blipFill>
-                      <a:blip r:embed="rId4"/>
-                      <a:stretch>
-                        <a:fillRect/>
-                      </a:stretch>
-                    </p:blipFill>
-                    <p:spPr>
-                      <a:xfrm>
-                        <a:off x="5431929" y="4796439"/>
-                        <a:ext cx="3024010" cy="1109751"/>
-                      </a:xfrm>
-                      <a:prstGeom prst="rect">
-                        <a:avLst/>
-                      </a:prstGeom>
-                    </p:spPr>
-                  </p:pic>
-                </p:oleObj>
-              </mc:Fallback>
-            </mc:AlternateContent>
-          </a:graphicData>
-        </a:graphic>
-      </p:graphicFrame>
-      <p:graphicFrame>
-        <p:nvGraphicFramePr>
-          <p:cNvPr id="8" name="Object 7"/>
-          <p:cNvGraphicFramePr>
-            <a:graphicFrameLocks noChangeAspect="1"/>
-          </p:cNvGraphicFramePr>
-          <p:nvPr>
-            <p:extLst>
-              <p:ext uri="{D42A27DB-BD31-4B8C-83A1-F6EECF244321}">
-                <p14:modId xmlns:p14="http://schemas.microsoft.com/office/powerpoint/2010/main" val="1607775002"/>
-              </p:ext>
-            </p:extLst>
-          </p:nvPr>
-        </p:nvGraphicFramePr>
-        <p:xfrm>
-          <a:off x="1298711" y="4350543"/>
-          <a:ext cx="3243014" cy="985837"/>
-        </p:xfrm>
-        <a:graphic>
-          <a:graphicData uri="http://schemas.openxmlformats.org/presentationml/2006/ole">
-            <mc:AlternateContent xmlns:mc="http://schemas.openxmlformats.org/markup-compatibility/2006">
-              <mc:Choice xmlns:v="urn:schemas-microsoft-com:vml" Requires="v">
-                <p:oleObj spid="_x0000_s5578" name="Equation" r:id="rId5" imgW="1295400" imgH="393700" progId="Equation.3">
-                  <p:embed/>
-                </p:oleObj>
-              </mc:Choice>
-              <mc:Fallback>
-                <p:oleObj name="Equation" r:id="rId5" imgW="1295400" imgH="393700" progId="Equation.3">
-                  <p:embed/>
-                  <p:pic>
-                    <p:nvPicPr>
-                      <p:cNvPr id="0" name=""/>
-                      <p:cNvPicPr/>
-                      <p:nvPr/>
-                    </p:nvPicPr>
-                    <p:blipFill>
-                      <a:blip r:embed="rId6"/>
-                      <a:stretch>
-                        <a:fillRect/>
-                      </a:stretch>
-                    </p:blipFill>
-                    <p:spPr>
-                      <a:xfrm>
-                        <a:off x="1298711" y="4350543"/>
-                        <a:ext cx="3243014" cy="985837"/>
-                      </a:xfrm>
-                      <a:prstGeom prst="rect">
-                        <a:avLst/>
-                      </a:prstGeom>
-                    </p:spPr>
-                  </p:pic>
-                </p:oleObj>
-              </mc:Fallback>
-            </mc:AlternateContent>
-          </a:graphicData>
-        </a:graphic>
-      </p:graphicFrame>
-      <p:graphicFrame>
-        <p:nvGraphicFramePr>
-          <p:cNvPr id="11" name="Object 10"/>
-          <p:cNvGraphicFramePr>
-            <a:graphicFrameLocks noChangeAspect="1"/>
-          </p:cNvGraphicFramePr>
-          <p:nvPr>
-            <p:extLst>
-              <p:ext uri="{D42A27DB-BD31-4B8C-83A1-F6EECF244321}">
-                <p14:modId xmlns:p14="http://schemas.microsoft.com/office/powerpoint/2010/main" val="3012097170"/>
-              </p:ext>
-            </p:extLst>
-          </p:nvPr>
-        </p:nvGraphicFramePr>
-        <p:xfrm>
-          <a:off x="6035737" y="2822004"/>
-          <a:ext cx="1017587" cy="523875"/>
-        </p:xfrm>
-        <a:graphic>
-          <a:graphicData uri="http://schemas.openxmlformats.org/presentationml/2006/ole">
-            <mc:AlternateContent xmlns:mc="http://schemas.openxmlformats.org/markup-compatibility/2006">
-              <mc:Choice xmlns:v="urn:schemas-microsoft-com:vml" Requires="v">
-                <p:oleObj spid="_x0000_s5579" name="Equation" r:id="rId7" imgW="419100" imgH="215900" progId="Equation.3">
-                  <p:embed/>
-                </p:oleObj>
-              </mc:Choice>
-              <mc:Fallback>
-                <p:oleObj name="Equation" r:id="rId7" imgW="419100" imgH="215900" progId="Equation.3">
-                  <p:embed/>
-                  <p:pic>
-                    <p:nvPicPr>
-                      <p:cNvPr id="0" name=""/>
-                      <p:cNvPicPr/>
-                      <p:nvPr/>
-                    </p:nvPicPr>
-                    <p:blipFill>
-                      <a:blip r:embed="rId8"/>
-                      <a:stretch>
-                        <a:fillRect/>
-                      </a:stretch>
-                    </p:blipFill>
-                    <p:spPr>
-                      <a:xfrm>
-                        <a:off x="6035737" y="2822004"/>
-                        <a:ext cx="1017587" cy="523875"/>
-                      </a:xfrm>
-                      <a:prstGeom prst="rect">
-                        <a:avLst/>
-                      </a:prstGeom>
-                    </p:spPr>
-                  </p:pic>
-                </p:oleObj>
-              </mc:Fallback>
-            </mc:AlternateContent>
-          </a:graphicData>
-        </a:graphic>
-      </p:graphicFrame>
-      <p:sp>
-        <p:nvSpPr>
-          <p:cNvPr id="12" name="Left Brace 11"/>
-          <p:cNvSpPr/>
-          <p:nvPr/>
-        </p:nvSpPr>
-        <p:spPr bwMode="auto">
-          <a:xfrm rot="16200000">
-            <a:off x="3948188" y="4694905"/>
-            <a:ext cx="172286" cy="918955"/>
-          </a:xfrm>
-          <a:prstGeom prst="leftBrace">
-            <a:avLst>
-              <a:gd name="adj1" fmla="val 22620"/>
-              <a:gd name="adj2" fmla="val 50000"/>
-            </a:avLst>
-          </a:prstGeom>
-          <a:noFill/>
-          <a:ln w="9525" cap="flat" cmpd="sng" algn="ctr">
-            <a:solidFill>
-              <a:schemeClr val="tx1"/>
-            </a:solidFill>
-            <a:prstDash val="solid"/>
-            <a:round/>
-            <a:headEnd type="none" w="med" len="med"/>
-            <a:tailEnd type="none" w="med" len="med"/>
-          </a:ln>
-          <a:effectLst/>
-        </p:spPr>
-        <p:txBody>
-          <a:bodyPr vert="horz" wrap="square" lIns="91440" tIns="45720" rIns="91440" bIns="45720" numCol="1" rtlCol="0" anchor="t" anchorCtr="0" compatLnSpc="1">
-            <a:prstTxWarp prst="textNoShape">
-              <a:avLst/>
-            </a:prstTxWarp>
-          </a:bodyPr>
-          <a:lstStyle/>
-          <a:p>
-            <a:pPr marL="0" marR="0" indent="0" algn="l" defTabSz="914400" rtl="0" eaLnBrk="0" fontAlgn="base" latinLnBrk="0" hangingPunct="0">
-              <a:lnSpc>
-                <a:spcPct val="100000"/>
-              </a:lnSpc>
-              <a:spcBef>
-                <a:spcPct val="0"/>
-              </a:spcBef>
-              <a:spcAft>
-                <a:spcPct val="0"/>
-              </a:spcAft>
-              <a:buClrTx/>
-              <a:buSzTx/>
-              <a:buFontTx/>
-              <a:buNone/>
-              <a:tabLst/>
-            </a:pPr>
-            <a:endParaRPr kumimoji="0" lang="en-US" sz="2400" b="0" i="0" u="none" strike="noStrike" cap="none" normalizeH="0" baseline="0" smtClean="0">
-              <a:ln>
-                <a:noFill/>
-              </a:ln>
-              <a:solidFill>
-                <a:schemeClr val="tx1"/>
-              </a:solidFill>
-              <a:effectLst/>
-              <a:latin typeface="Times New Roman" pitchFamily="18" charset="0"/>
-            </a:endParaRPr>
-          </a:p>
-        </p:txBody>
-      </p:sp>
-      <p:cxnSp>
-        <p:nvCxnSpPr>
-          <p:cNvPr id="14" name="Elbow Connector 13"/>
-          <p:cNvCxnSpPr/>
-          <p:nvPr/>
-        </p:nvCxnSpPr>
-        <p:spPr bwMode="auto">
-          <a:xfrm>
-            <a:off x="4037378" y="5288454"/>
-            <a:ext cx="1370591" cy="47926"/>
-          </a:xfrm>
-          <a:prstGeom prst="bentConnector3">
-            <a:avLst>
-              <a:gd name="adj1" fmla="val 176"/>
-            </a:avLst>
-          </a:prstGeom>
-          <a:solidFill>
-            <a:schemeClr val="accent1"/>
-          </a:solidFill>
-          <a:ln w="9525" cap="flat" cmpd="sng" algn="ctr">
-            <a:solidFill>
-              <a:schemeClr val="tx1"/>
-            </a:solidFill>
-            <a:prstDash val="solid"/>
-            <a:round/>
-            <a:headEnd type="none" w="med" len="med"/>
-            <a:tailEnd type="arrow"/>
-          </a:ln>
-          <a:effectLst/>
-        </p:spPr>
-      </p:cxnSp>
-      <p:sp>
-        <p:nvSpPr>
-          <p:cNvPr id="18" name="Left Brace 17"/>
-          <p:cNvSpPr/>
-          <p:nvPr/>
-        </p:nvSpPr>
-        <p:spPr bwMode="auto">
-          <a:xfrm rot="16200000">
-            <a:off x="2853731" y="5204423"/>
-            <a:ext cx="172286" cy="462526"/>
-          </a:xfrm>
-          <a:prstGeom prst="leftBrace">
-            <a:avLst>
-              <a:gd name="adj1" fmla="val 22620"/>
-              <a:gd name="adj2" fmla="val 50000"/>
-            </a:avLst>
-          </a:prstGeom>
-          <a:noFill/>
-          <a:ln w="9525" cap="flat" cmpd="sng" algn="ctr">
-            <a:solidFill>
-              <a:schemeClr val="tx1"/>
-            </a:solidFill>
-            <a:prstDash val="solid"/>
-            <a:round/>
-            <a:headEnd type="none" w="med" len="med"/>
-            <a:tailEnd type="none" w="med" len="med"/>
-          </a:ln>
-          <a:effectLst/>
-        </p:spPr>
-        <p:txBody>
-          <a:bodyPr vert="horz" wrap="square" lIns="91440" tIns="45720" rIns="91440" bIns="45720" numCol="1" rtlCol="0" anchor="t" anchorCtr="0" compatLnSpc="1">
-            <a:prstTxWarp prst="textNoShape">
-              <a:avLst/>
-            </a:prstTxWarp>
-          </a:bodyPr>
-          <a:lstStyle/>
-          <a:p>
-            <a:pPr marL="0" marR="0" indent="0" algn="l" defTabSz="914400" rtl="0" eaLnBrk="0" fontAlgn="base" latinLnBrk="0" hangingPunct="0">
-              <a:lnSpc>
-                <a:spcPct val="100000"/>
-              </a:lnSpc>
-              <a:spcBef>
-                <a:spcPct val="0"/>
-              </a:spcBef>
-              <a:spcAft>
-                <a:spcPct val="0"/>
-              </a:spcAft>
-              <a:buClrTx/>
-              <a:buSzTx/>
-              <a:buFontTx/>
-              <a:buNone/>
-              <a:tabLst/>
-            </a:pPr>
-            <a:endParaRPr kumimoji="0" lang="en-US" sz="2400" b="0" i="0" u="none" strike="noStrike" cap="none" normalizeH="0" baseline="0" smtClean="0">
-              <a:ln>
-                <a:noFill/>
-              </a:ln>
-              <a:solidFill>
-                <a:schemeClr val="tx1"/>
-              </a:solidFill>
-              <a:effectLst/>
-              <a:latin typeface="Times New Roman" pitchFamily="18" charset="0"/>
-            </a:endParaRPr>
-          </a:p>
-        </p:txBody>
-      </p:sp>
-      <p:cxnSp>
-        <p:nvCxnSpPr>
-          <p:cNvPr id="19" name="Elbow Connector 18"/>
-          <p:cNvCxnSpPr/>
-          <p:nvPr/>
-        </p:nvCxnSpPr>
-        <p:spPr bwMode="auto">
-          <a:xfrm>
-            <a:off x="2949457" y="5568044"/>
-            <a:ext cx="932175" cy="650435"/>
-          </a:xfrm>
-          <a:prstGeom prst="bentConnector3">
-            <a:avLst>
-              <a:gd name="adj1" fmla="val -123"/>
-            </a:avLst>
-          </a:prstGeom>
-          <a:solidFill>
-            <a:schemeClr val="accent1"/>
-          </a:solidFill>
-          <a:ln w="9525" cap="flat" cmpd="sng" algn="ctr">
-            <a:solidFill>
-              <a:schemeClr val="tx1"/>
-            </a:solidFill>
-            <a:prstDash val="solid"/>
-            <a:round/>
-            <a:headEnd type="none" w="med" len="med"/>
-            <a:tailEnd type="arrow"/>
-          </a:ln>
-          <a:effectLst/>
-        </p:spPr>
-      </p:cxnSp>
-      <p:sp>
-        <p:nvSpPr>
-          <p:cNvPr id="23" name="Rectangle 22"/>
-          <p:cNvSpPr/>
-          <p:nvPr/>
-        </p:nvSpPr>
-        <p:spPr>
-          <a:xfrm>
-            <a:off x="3900752" y="5904578"/>
-            <a:ext cx="4572000" cy="707886"/>
-          </a:xfrm>
-          <a:prstGeom prst="rect">
-            <a:avLst/>
-          </a:prstGeom>
-        </p:spPr>
-        <p:txBody>
-          <a:bodyPr>
-            <a:spAutoFit/>
-          </a:bodyPr>
-          <a:lstStyle/>
-          <a:p>
-            <a:r>
-              <a:rPr lang="en-US" sz="2000" dirty="0">
-                <a:latin typeface="+mn-lt"/>
-              </a:rPr>
-              <a:t>index set of all desired polynomial orders up to order </a:t>
-            </a:r>
-            <a:r>
-              <a:rPr lang="en-US" sz="2000" i="1" dirty="0" smtClean="0">
-                <a:latin typeface="Times New Roman"/>
-                <a:cs typeface="Times New Roman"/>
-              </a:rPr>
-              <a:t>L</a:t>
-            </a:r>
-            <a:endParaRPr lang="en-US" sz="2000" i="1" dirty="0">
-              <a:latin typeface="Times New Roman"/>
-              <a:cs typeface="Times New Roman"/>
-            </a:endParaRPr>
-          </a:p>
-        </p:txBody>
-      </p:sp>
-    </p:spTree>
-    <p:extLst>
-      <p:ext uri="{BB962C8B-B14F-4D97-AF65-F5344CB8AC3E}">
-        <p14:creationId xmlns:p14="http://schemas.microsoft.com/office/powerpoint/2010/main" val="1971946545"/>
-      </p:ext>
-    </p:extLst>
-  </p:cSld>
-  <p:clrMapOvr>
-    <a:masterClrMapping/>
-  </p:clrMapOvr>
-  <p:timing>
-    <p:tnLst>
-      <p:par>
-        <p:cTn xmlns:p14="http://schemas.microsoft.com/office/powerpoint/2010/main" id="1" dur="indefinite" restart="never" nodeType="tmRoot"/>
-      </p:par>
-    </p:tnLst>
-  </p:timing>
-</p:sld>
-</file>
-
 <file path=ppt/slides/slide4.xml><?xml version="1.0" encoding="utf-8"?>
 <p:sld xmlns:a="http://schemas.openxmlformats.org/drawingml/2006/main" xmlns:r="http://schemas.openxmlformats.org/officeDocument/2006/relationships" xmlns:p="http://schemas.openxmlformats.org/presentationml/2006/main">
   <p:cSld>
@@ -56142,7 +55160,7 @@
           <a:graphicData uri="http://schemas.openxmlformats.org/presentationml/2006/ole">
             <mc:AlternateContent xmlns:mc="http://schemas.openxmlformats.org/markup-compatibility/2006">
               <mc:Choice xmlns:v="urn:schemas-microsoft-com:vml" Requires="v">
-                <p:oleObj spid="_x0000_s3280" name="Equation" r:id="rId3" imgW="1727200" imgH="241300" progId="Equation.3">
+                <p:oleObj spid="_x0000_s3286" name="Equation" r:id="rId3" imgW="1727200" imgH="241300" progId="Equation.3">
                   <p:embed/>
                 </p:oleObj>
               </mc:Choice>
@@ -56767,7 +55785,7 @@
           <a:graphicData uri="http://schemas.openxmlformats.org/presentationml/2006/ole">
             <mc:AlternateContent xmlns:mc="http://schemas.openxmlformats.org/markup-compatibility/2006">
               <mc:Choice xmlns:v="urn:schemas-microsoft-com:vml" Requires="v">
-                <p:oleObj spid="_x0000_s12361" name="Equation" r:id="rId4" imgW="647700" imgH="165100" progId="Equation.3">
+                <p:oleObj spid="_x0000_s12367" name="Equation" r:id="rId4" imgW="647700" imgH="165100" progId="Equation.3">
                   <p:embed/>
                 </p:oleObj>
               </mc:Choice>

</xml_diff>

<commit_message>
add hands on tests for rom
</commit_message>
<xml_diff>
--- a/doc/workshop/reducedOrderModeling/ROM.pptx
+++ b/doc/workshop/reducedOrderModeling/ROM.pptx
@@ -33842,7 +33842,7 @@
           <p:cNvPr id="2" name="Title 1">
             <a:extLst>
               <a:ext uri="{FF2B5EF4-FFF2-40B4-BE49-F238E27FC236}">
-                <a16:creationId xmlns:a16="http://schemas.microsoft.com/office/drawing/2014/main" xmlns="" id="{947C2D4B-6EB3-C544-88A4-979AB31FDE9D}"/>
+                <a16:creationId xmlns="" xmlns:a16="http://schemas.microsoft.com/office/drawing/2014/main" id="{947C2D4B-6EB3-C544-88A4-979AB31FDE9D}"/>
               </a:ext>
             </a:extLst>
           </p:cNvPr>
@@ -33870,7 +33870,7 @@
           <p:cNvPr id="3" name="Content Placeholder 2">
             <a:extLst>
               <a:ext uri="{FF2B5EF4-FFF2-40B4-BE49-F238E27FC236}">
-                <a16:creationId xmlns:a16="http://schemas.microsoft.com/office/drawing/2014/main" xmlns="" id="{D08E8F85-C01D-8143-BD69-34E1CC87E338}"/>
+                <a16:creationId xmlns="" xmlns:a16="http://schemas.microsoft.com/office/drawing/2014/main" id="{D08E8F85-C01D-8143-BD69-34E1CC87E338}"/>
               </a:ext>
             </a:extLst>
           </p:cNvPr>
@@ -33942,7 +33942,7 @@
           <p:cNvPr id="4" name="TextBox 3">
             <a:extLst>
               <a:ext uri="{FF2B5EF4-FFF2-40B4-BE49-F238E27FC236}">
-                <a16:creationId xmlns:a16="http://schemas.microsoft.com/office/drawing/2014/main" xmlns="" id="{87C2AEDC-53C9-3146-8BFF-639AE949C68B}"/>
+                <a16:creationId xmlns="" xmlns:a16="http://schemas.microsoft.com/office/drawing/2014/main" id="{87C2AEDC-53C9-3146-8BFF-639AE949C68B}"/>
               </a:ext>
             </a:extLst>
           </p:cNvPr>
@@ -34035,7 +34035,7 @@
           <p:cNvPr id="5" name="TextBox 4">
             <a:extLst>
               <a:ext uri="{FF2B5EF4-FFF2-40B4-BE49-F238E27FC236}">
-                <a16:creationId xmlns:a16="http://schemas.microsoft.com/office/drawing/2014/main" xmlns="" id="{C78B8FF2-02F6-B645-B684-E17854069A2E}"/>
+                <a16:creationId xmlns="" xmlns:a16="http://schemas.microsoft.com/office/drawing/2014/main" id="{C78B8FF2-02F6-B645-B684-E17854069A2E}"/>
               </a:ext>
             </a:extLst>
           </p:cNvPr>
@@ -34136,7 +34136,7 @@
           <p:cNvPr id="2" name="Title 1">
             <a:extLst>
               <a:ext uri="{FF2B5EF4-FFF2-40B4-BE49-F238E27FC236}">
-                <a16:creationId xmlns:a16="http://schemas.microsoft.com/office/drawing/2014/main" xmlns="" id="{0AE31D52-5930-C243-B568-FA985C89546D}"/>
+                <a16:creationId xmlns="" xmlns:a16="http://schemas.microsoft.com/office/drawing/2014/main" id="{0AE31D52-5930-C243-B568-FA985C89546D}"/>
               </a:ext>
             </a:extLst>
           </p:cNvPr>
@@ -34159,14 +34159,14 @@
           </a:p>
         </p:txBody>
       </p:sp>
-      <mc:AlternateContent xmlns:mc="http://schemas.openxmlformats.org/markup-compatibility/2006">
-        <mc:Choice xmlns:a14="http://schemas.microsoft.com/office/drawing/2010/main" Requires="a14">
+      <mc:AlternateContent xmlns:mc="http://schemas.openxmlformats.org/markup-compatibility/2006" xmlns:a14="http://schemas.microsoft.com/office/drawing/2010/main">
+        <mc:Choice Requires="a14">
           <p:sp>
             <p:nvSpPr>
               <p:cNvPr id="3" name="Content Placeholder 2">
                 <a:extLst>
                   <a:ext uri="{FF2B5EF4-FFF2-40B4-BE49-F238E27FC236}">
-                    <a16:creationId xmlns:a16="http://schemas.microsoft.com/office/drawing/2014/main" xmlns="" id="{71F9B043-F349-114D-84AF-4DF2056FA707}"/>
+                    <a16:creationId xmlns="" xmlns:a16="http://schemas.microsoft.com/office/drawing/2014/main" id="{71F9B043-F349-114D-84AF-4DF2056FA707}"/>
                   </a:ext>
                 </a:extLst>
               </p:cNvPr>
@@ -34248,7 +34248,6 @@
               </a:p>
               <a:p>
                 <a:pPr lvl="1"/>
-                <a14:m/>
                 <a:r>
                   <a:rPr lang="en-US" dirty="0"/>
                   <a:t>, the launch angle</a:t>
@@ -34273,7 +34272,6 @@
               </a:p>
               <a:p>
                 <a:pPr lvl="1"/>
-                <a14:m/>
                 <a:r>
                   <a:rPr lang="en-US" dirty="0"/>
                   <a:t>, the horizontal position throughout the arc</a:t>
@@ -34281,7 +34279,6 @@
               </a:p>
               <a:p>
                 <a:pPr lvl="1"/>
-                <a14:m/>
                 <a:r>
                   <a:rPr lang="en-US" dirty="0"/>
                   <a:t>, the vertical position throughout the arc</a:t>
@@ -34289,7 +34286,6 @@
               </a:p>
               <a:p>
                 <a:pPr lvl="1"/>
-                <a14:m/>
                 <a:r>
                   <a:rPr lang="en-US" dirty="0"/>
                   <a:t>, the range or furthest point reached</a:t>
@@ -34297,7 +34293,6 @@
               </a:p>
               <a:p>
                 <a:pPr lvl="1"/>
-                <a14:m/>
                 <a:r>
                   <a:rPr lang="en-US" dirty="0"/>
                   <a:t>, the time of flight</a:t>
@@ -34333,7 +34328,7 @@
             </p:txBody>
           </p:sp>
         </mc:Choice>
-        <mc:Fallback>
+        <mc:Fallback xmlns="">
           <p:sp>
             <p:nvSpPr>
               <p:cNvPr id="3" name="Content Placeholder 2">
@@ -35332,13 +35327,7 @@
               <a:rPr lang="en-US" sz="1400" b="1" dirty="0" err="1" smtClean="0">
                 <a:latin typeface="+mn-lt"/>
               </a:rPr>
-              <a:t>projectile</a:t>
-            </a:r>
-            <a:r>
-              <a:rPr lang="en-US" sz="1400" b="1" dirty="0" err="1" smtClean="0">
-                <a:latin typeface="+mn-lt"/>
-              </a:rPr>
-              <a:t>.py</a:t>
+              <a:t>projectile.py</a:t>
             </a:r>
             <a:r>
               <a:rPr lang="en-US" sz="1400" b="1" dirty="0" smtClean="0">
@@ -41804,17 +41793,7 @@
                 <a:latin typeface="Courier"/>
                 <a:cs typeface="Courier"/>
               </a:rPr>
-              <a:t>"</a:t>
-            </a:r>
-            <a:r>
-              <a:rPr lang="en-US" sz="1400" dirty="0" smtClean="0">
-                <a:solidFill>
-                  <a:srgbClr val="1A4DB2"/>
-                </a:solidFill>
-                <a:latin typeface="Courier"/>
-                <a:cs typeface="Courier"/>
-              </a:rPr>
-              <a:t>10”</a:t>
+              <a:t>"10”</a:t>
             </a:r>
             <a:r>
               <a:rPr lang="en-US" sz="1400" dirty="0" smtClean="0">
@@ -52782,7 +52761,7 @@
           <a:p>
             <a:r>
               <a:rPr lang="en-US" dirty="0" smtClean="0"/>
-              <a:t>Example</a:t>
+              <a:t>Exercises</a:t>
             </a:r>
             <a:endParaRPr lang="en-US" dirty="0"/>
           </a:p>
@@ -52805,51 +52784,176 @@
           <a:p>
             <a:r>
               <a:rPr lang="en-US" dirty="0" smtClean="0"/>
-              <a:t>Construct a ROM: 2_train_rom.xml</a:t>
-            </a:r>
-          </a:p>
-          <a:p>
+              <a:t>Construct a ROM: </a:t>
+            </a:r>
             <a:r>
               <a:rPr lang="en-US" dirty="0" smtClean="0"/>
-              <a:t>Pickle a ROM: 3_pickle_rom.xml</a:t>
-            </a:r>
-          </a:p>
-          <a:p>
-            <a:r>
-              <a:rPr lang="en-US" dirty="0" smtClean="0"/>
-              <a:t>Load a ROM: 4_load_rom.xml</a:t>
-            </a:r>
-          </a:p>
-          <a:p>
-            <a:r>
-              <a:rPr lang="en-US" dirty="0" smtClean="0"/>
-              <a:t>Sample a ROM: 5_sample_rom.xml</a:t>
-            </a:r>
-          </a:p>
-          <a:p>
-            <a:r>
-              <a:rPr lang="en-US" dirty="0" smtClean="0"/>
-              <a:t>Sample a loaded ROM: 6_sample_prom.xml</a:t>
-            </a:r>
-          </a:p>
-          <a:p>
-            <a:r>
-              <a:rPr lang="en-US" dirty="0" smtClean="0"/>
-              <a:t>Evaluate a ROM: 7_evaluate_rom.xml</a:t>
+              <a:t>2_train_rom.xml</a:t>
             </a:r>
           </a:p>
           <a:p>
             <a:pPr lvl="1"/>
             <a:r>
               <a:rPr lang="en-US" dirty="0" smtClean="0"/>
-              <a:t>Change the number of samples: 20, 100, 200, 1000</a:t>
+              <a:t>Add a </a:t>
+            </a:r>
+            <a:r>
+              <a:rPr lang="en-US" dirty="0" err="1" smtClean="0"/>
+              <a:t>RomTrainer</a:t>
+            </a:r>
+            <a:r>
+              <a:rPr lang="en-US" dirty="0" smtClean="0"/>
+              <a:t> Step</a:t>
+            </a:r>
+            <a:endParaRPr lang="en-US" dirty="0" smtClean="0"/>
+          </a:p>
+          <a:p>
+            <a:r>
+              <a:rPr lang="en-US" dirty="0" smtClean="0"/>
+              <a:t>Pickle a ROM: </a:t>
+            </a:r>
+            <a:r>
+              <a:rPr lang="en-US" dirty="0" smtClean="0"/>
+              <a:t>3_pickle_rom.xml</a:t>
             </a:r>
           </a:p>
           <a:p>
             <a:pPr lvl="1"/>
             <a:r>
               <a:rPr lang="en-US" dirty="0" smtClean="0"/>
-              <a:t>Change initial seed</a:t>
+              <a:t>Use </a:t>
+            </a:r>
+            <a:r>
+              <a:rPr lang="en-US" dirty="0" err="1" smtClean="0"/>
+              <a:t>IOStep</a:t>
+            </a:r>
+            <a:r>
+              <a:rPr lang="en-US" dirty="0" smtClean="0"/>
+              <a:t> to </a:t>
+            </a:r>
+            <a:r>
+              <a:rPr lang="en-US" dirty="0" err="1" smtClean="0"/>
+              <a:t>picke</a:t>
+            </a:r>
+            <a:r>
+              <a:rPr lang="en-US" dirty="0" smtClean="0"/>
+              <a:t> a ROM</a:t>
+            </a:r>
+            <a:endParaRPr lang="en-US" dirty="0" smtClean="0"/>
+          </a:p>
+          <a:p>
+            <a:r>
+              <a:rPr lang="en-US" dirty="0" smtClean="0"/>
+              <a:t>Load a ROM: </a:t>
+            </a:r>
+            <a:r>
+              <a:rPr lang="en-US" dirty="0" smtClean="0"/>
+              <a:t>4_load_rom.xml</a:t>
+            </a:r>
+          </a:p>
+          <a:p>
+            <a:pPr lvl="1"/>
+            <a:r>
+              <a:rPr lang="en-US" dirty="0" smtClean="0"/>
+              <a:t>Use </a:t>
+            </a:r>
+            <a:r>
+              <a:rPr lang="en-US" dirty="0" err="1" smtClean="0"/>
+              <a:t>IOStep</a:t>
+            </a:r>
+            <a:r>
+              <a:rPr lang="en-US" dirty="0" smtClean="0"/>
+              <a:t> to load a ROM</a:t>
+            </a:r>
+            <a:endParaRPr lang="en-US" dirty="0" smtClean="0"/>
+          </a:p>
+          <a:p>
+            <a:r>
+              <a:rPr lang="en-US" dirty="0" smtClean="0"/>
+              <a:t>Sample a ROM: </a:t>
+            </a:r>
+            <a:r>
+              <a:rPr lang="en-US" dirty="0" smtClean="0"/>
+              <a:t>5_sample_rom.xml</a:t>
+            </a:r>
+          </a:p>
+          <a:p>
+            <a:pPr lvl="1"/>
+            <a:r>
+              <a:rPr lang="en-US" dirty="0" smtClean="0"/>
+              <a:t>Use </a:t>
+            </a:r>
+            <a:r>
+              <a:rPr lang="en-US" dirty="0" err="1" smtClean="0"/>
+              <a:t>MultiRun</a:t>
+            </a:r>
+            <a:r>
+              <a:rPr lang="en-US" dirty="0" smtClean="0"/>
+              <a:t> to sample a ROM</a:t>
+            </a:r>
+            <a:endParaRPr lang="en-US" dirty="0" smtClean="0"/>
+          </a:p>
+          <a:p>
+            <a:r>
+              <a:rPr lang="en-US" dirty="0" smtClean="0"/>
+              <a:t>Sample a loaded ROM: </a:t>
+            </a:r>
+            <a:r>
+              <a:rPr lang="en-US" dirty="0" smtClean="0"/>
+              <a:t>6_sample_prom.xml</a:t>
+            </a:r>
+          </a:p>
+          <a:p>
+            <a:pPr lvl="1"/>
+            <a:r>
+              <a:rPr lang="en-US" dirty="0" smtClean="0"/>
+              <a:t>Use </a:t>
+            </a:r>
+            <a:r>
+              <a:rPr lang="en-US" dirty="0" err="1" smtClean="0"/>
+              <a:t>MultiRun</a:t>
+            </a:r>
+            <a:r>
+              <a:rPr lang="en-US" dirty="0" smtClean="0"/>
+              <a:t> to sample a pickled ROM</a:t>
+            </a:r>
+            <a:endParaRPr lang="en-US" dirty="0" smtClean="0"/>
+          </a:p>
+          <a:p>
+            <a:r>
+              <a:rPr lang="en-US" dirty="0" smtClean="0"/>
+              <a:t>Evaluate a ROM: </a:t>
+            </a:r>
+            <a:r>
+              <a:rPr lang="en-US" dirty="0" smtClean="0"/>
+              <a:t>7_evaluate_rom.xml</a:t>
+            </a:r>
+          </a:p>
+          <a:p>
+            <a:pPr lvl="1"/>
+            <a:r>
+              <a:rPr lang="en-US" dirty="0" smtClean="0"/>
+              <a:t>Add additional </a:t>
+            </a:r>
+            <a:r>
+              <a:rPr lang="en-US" dirty="0" err="1" smtClean="0"/>
+              <a:t>MonteCarlo</a:t>
+            </a:r>
+            <a:r>
+              <a:rPr lang="en-US" dirty="0" smtClean="0"/>
+              <a:t> Sampler to evaluate a ROM</a:t>
+            </a:r>
+            <a:endParaRPr lang="en-US" dirty="0" smtClean="0"/>
+          </a:p>
+          <a:p>
+            <a:pPr lvl="1"/>
+            <a:r>
+              <a:rPr lang="en-US" dirty="0" smtClean="0"/>
+              <a:t>Change the number of samples: 20, 100, 200, </a:t>
+            </a:r>
+            <a:r>
+              <a:rPr lang="en-US" dirty="0" smtClean="0"/>
+              <a:t>1000</a:t>
             </a:r>
             <a:endParaRPr lang="en-US" dirty="0"/>
           </a:p>
@@ -53090,7 +53194,7 @@
           <a:graphicData uri="http://schemas.openxmlformats.org/presentationml/2006/ole">
             <mc:AlternateContent xmlns:mc="http://schemas.openxmlformats.org/markup-compatibility/2006">
               <mc:Choice xmlns:v="urn:schemas-microsoft-com:vml" Requires="v">
-                <p:oleObj spid="_x0000_s5595" name="Equation" r:id="rId3" imgW="1244600" imgH="457200" progId="Equation.3">
+                <p:oleObj spid="_x0000_s5605" name="Equation" r:id="rId3" imgW="1244600" imgH="457200" progId="Equation.3">
                   <p:embed/>
                 </p:oleObj>
               </mc:Choice>
@@ -53147,7 +53251,7 @@
           <a:graphicData uri="http://schemas.openxmlformats.org/presentationml/2006/ole">
             <mc:AlternateContent xmlns:mc="http://schemas.openxmlformats.org/markup-compatibility/2006">
               <mc:Choice xmlns:v="urn:schemas-microsoft-com:vml" Requires="v">
-                <p:oleObj spid="_x0000_s5596" name="Equation" r:id="rId5" imgW="1295400" imgH="393700" progId="Equation.3">
+                <p:oleObj spid="_x0000_s5606" name="Equation" r:id="rId5" imgW="1295400" imgH="393700" progId="Equation.3">
                   <p:embed/>
                 </p:oleObj>
               </mc:Choice>
@@ -53204,7 +53308,7 @@
           <a:graphicData uri="http://schemas.openxmlformats.org/presentationml/2006/ole">
             <mc:AlternateContent xmlns:mc="http://schemas.openxmlformats.org/markup-compatibility/2006">
               <mc:Choice xmlns:v="urn:schemas-microsoft-com:vml" Requires="v">
-                <p:oleObj spid="_x0000_s5597" name="Equation" r:id="rId7" imgW="419100" imgH="215900" progId="Equation.3">
+                <p:oleObj spid="_x0000_s5607" name="Equation" r:id="rId7" imgW="419100" imgH="215900" progId="Equation.3">
                   <p:embed/>
                 </p:oleObj>
               </mc:Choice>
@@ -53716,7 +53820,7 @@
           <a:graphicData uri="http://schemas.openxmlformats.org/presentationml/2006/ole">
             <mc:AlternateContent xmlns:mc="http://schemas.openxmlformats.org/markup-compatibility/2006">
               <mc:Choice xmlns:v="urn:schemas-microsoft-com:vml" Requires="v">
-                <p:oleObj spid="_x0000_s7758" name="Equation" r:id="rId4" imgW="635000" imgH="241300" progId="Equation.3">
+                <p:oleObj spid="_x0000_s7777" name="Equation" r:id="rId4" imgW="635000" imgH="241300" progId="Equation.3">
                   <p:embed/>
                 </p:oleObj>
               </mc:Choice>
@@ -53773,7 +53877,7 @@
           <a:graphicData uri="http://schemas.openxmlformats.org/presentationml/2006/ole">
             <mc:AlternateContent xmlns:mc="http://schemas.openxmlformats.org/markup-compatibility/2006">
               <mc:Choice xmlns:v="urn:schemas-microsoft-com:vml" Requires="v">
-                <p:oleObj spid="_x0000_s7759" name="Equation" r:id="rId6" imgW="609600" imgH="177800" progId="Equation.3">
+                <p:oleObj spid="_x0000_s7778" name="Equation" r:id="rId6" imgW="609600" imgH="177800" progId="Equation.3">
                   <p:embed/>
                 </p:oleObj>
               </mc:Choice>
@@ -53987,7 +54091,7 @@
           <a:graphicData uri="http://schemas.openxmlformats.org/presentationml/2006/ole">
             <mc:AlternateContent xmlns:mc="http://schemas.openxmlformats.org/markup-compatibility/2006">
               <mc:Choice xmlns:v="urn:schemas-microsoft-com:vml" Requires="v">
-                <p:oleObj spid="_x0000_s7760" name="Equation" r:id="rId8" imgW="1727200" imgH="241300" progId="Equation.3">
+                <p:oleObj spid="_x0000_s7779" name="Equation" r:id="rId8" imgW="1727200" imgH="241300" progId="Equation.3">
                   <p:embed/>
                 </p:oleObj>
               </mc:Choice>
@@ -54457,7 +54561,7 @@
           <a:graphicData uri="http://schemas.openxmlformats.org/presentationml/2006/ole">
             <mc:AlternateContent xmlns:mc="http://schemas.openxmlformats.org/markup-compatibility/2006">
               <mc:Choice xmlns:v="urn:schemas-microsoft-com:vml" Requires="v">
-                <p:oleObj spid="_x0000_s7761" name="Equation" r:id="rId10" imgW="660400" imgH="241300" progId="Equation.3">
+                <p:oleObj spid="_x0000_s7780" name="Equation" r:id="rId10" imgW="660400" imgH="241300" progId="Equation.3">
                   <p:embed/>
                 </p:oleObj>
               </mc:Choice>
@@ -54552,7 +54656,7 @@
           <a:graphicData uri="http://schemas.openxmlformats.org/presentationml/2006/ole">
             <mc:AlternateContent xmlns:mc="http://schemas.openxmlformats.org/markup-compatibility/2006">
               <mc:Choice xmlns:v="urn:schemas-microsoft-com:vml" Requires="v">
-                <p:oleObj spid="_x0000_s7762" name="Equation" r:id="rId12" imgW="342900" imgH="203200" progId="Equation.3">
+                <p:oleObj spid="_x0000_s7781" name="Equation" r:id="rId12" imgW="342900" imgH="203200" progId="Equation.3">
                   <p:embed/>
                 </p:oleObj>
               </mc:Choice>
@@ -54807,7 +54911,7 @@
           <a:graphicData uri="http://schemas.openxmlformats.org/presentationml/2006/ole">
             <mc:AlternateContent xmlns:mc="http://schemas.openxmlformats.org/markup-compatibility/2006">
               <mc:Choice xmlns:v="urn:schemas-microsoft-com:vml" Requires="v">
-                <p:oleObj spid="_x0000_s7763" name="Equation" r:id="rId14" imgW="342900" imgH="203200" progId="Equation.3">
+                <p:oleObj spid="_x0000_s7782" name="Equation" r:id="rId14" imgW="342900" imgH="203200" progId="Equation.3">
                   <p:embed/>
                 </p:oleObj>
               </mc:Choice>
@@ -55160,7 +55264,7 @@
           <a:graphicData uri="http://schemas.openxmlformats.org/presentationml/2006/ole">
             <mc:AlternateContent xmlns:mc="http://schemas.openxmlformats.org/markup-compatibility/2006">
               <mc:Choice xmlns:v="urn:schemas-microsoft-com:vml" Requires="v">
-                <p:oleObj spid="_x0000_s3286" name="Equation" r:id="rId3" imgW="1727200" imgH="241300" progId="Equation.3">
+                <p:oleObj spid="_x0000_s3290" name="Equation" r:id="rId3" imgW="1727200" imgH="241300" progId="Equation.3">
                   <p:embed/>
                 </p:oleObj>
               </mc:Choice>
@@ -55785,7 +55889,7 @@
           <a:graphicData uri="http://schemas.openxmlformats.org/presentationml/2006/ole">
             <mc:AlternateContent xmlns:mc="http://schemas.openxmlformats.org/markup-compatibility/2006">
               <mc:Choice xmlns:v="urn:schemas-microsoft-com:vml" Requires="v">
-                <p:oleObj spid="_x0000_s12367" name="Equation" r:id="rId4" imgW="647700" imgH="165100" progId="Equation.3">
+                <p:oleObj spid="_x0000_s12371" name="Equation" r:id="rId4" imgW="647700" imgH="165100" progId="Equation.3">
                   <p:embed/>
                 </p:oleObj>
               </mc:Choice>
@@ -58303,7 +58407,7 @@
   </a:extraClrSchemeLst>
   <a:extLst>
     <a:ext uri="{05A4C25C-085E-4340-85A3-A5531E510DB2}">
-      <thm15:themeFamily xmlns="" xmlns:thm15="http://schemas.microsoft.com/office/thememl/2012/main" name="Standard_Presentation-2016" id="{AA70F70C-FE74-4105-B56D-A478567CF02D}" vid="{32DB2BA5-14E2-4538-A7F0-90025315B3E8}"/>
+      <thm15:themeFamily xmlns:thm15="http://schemas.microsoft.com/office/thememl/2012/main" xmlns="" name="Standard_Presentation-2016" id="{AA70F70C-FE74-4105-B56D-A478567CF02D}" vid="{32DB2BA5-14E2-4538-A7F0-90025315B3E8}"/>
     </a:ext>
   </a:extLst>
 </a:theme>

</xml_diff>

<commit_message>
updating ROM slides and fix activation duplication in MLPRegressor.py
</commit_message>
<xml_diff>
--- a/doc/workshop/reducedOrderModeling/ROM.pptx
+++ b/doc/workshop/reducedOrderModeling/ROM.pptx
@@ -1,14 +1,14 @@
 
 <file path=ppt/presentation.xml><?xml version="1.0" encoding="utf-8"?>
-<p:presentation xmlns:a="http://schemas.openxmlformats.org/drawingml/2006/main" xmlns:r="http://schemas.openxmlformats.org/officeDocument/2006/relationships" xmlns:p="http://schemas.openxmlformats.org/presentationml/2006/main" showSpecialPlsOnTitleSld="0" strictFirstAndLastChars="0" saveSubsetFonts="1">
+<p:presentation xmlns:a="http://schemas.openxmlformats.org/drawingml/2006/main" xmlns:r="http://schemas.openxmlformats.org/officeDocument/2006/relationships" xmlns:p="http://schemas.openxmlformats.org/presentationml/2006/main" firstSlideNum="0" showSpecialPlsOnTitleSld="0" strictFirstAndLastChars="0" saveSubsetFonts="1">
   <p:sldMasterIdLst>
     <p:sldMasterId id="2147483660" r:id="rId1"/>
   </p:sldMasterIdLst>
   <p:notesMasterIdLst>
-    <p:notesMasterId r:id="rId32"/>
+    <p:notesMasterId r:id="rId33"/>
   </p:notesMasterIdLst>
   <p:handoutMasterIdLst>
-    <p:handoutMasterId r:id="rId33"/>
+    <p:handoutMasterId r:id="rId34"/>
   </p:handoutMasterIdLst>
   <p:sldIdLst>
     <p:sldId id="272" r:id="rId2"/>
@@ -25,22 +25,23 @@
     <p:sldId id="333" r:id="rId13"/>
     <p:sldId id="334" r:id="rId14"/>
     <p:sldId id="335" r:id="rId15"/>
-    <p:sldId id="336" r:id="rId16"/>
-    <p:sldId id="337" r:id="rId17"/>
-    <p:sldId id="338" r:id="rId18"/>
-    <p:sldId id="339" r:id="rId19"/>
-    <p:sldId id="340" r:id="rId20"/>
-    <p:sldId id="341" r:id="rId21"/>
-    <p:sldId id="342" r:id="rId22"/>
-    <p:sldId id="343" r:id="rId23"/>
-    <p:sldId id="344" r:id="rId24"/>
-    <p:sldId id="345" r:id="rId25"/>
-    <p:sldId id="346" r:id="rId26"/>
-    <p:sldId id="347" r:id="rId27"/>
-    <p:sldId id="348" r:id="rId28"/>
-    <p:sldId id="349" r:id="rId29"/>
-    <p:sldId id="350" r:id="rId30"/>
-    <p:sldId id="284" r:id="rId31"/>
+    <p:sldId id="349" r:id="rId16"/>
+    <p:sldId id="336" r:id="rId17"/>
+    <p:sldId id="337" r:id="rId18"/>
+    <p:sldId id="338" r:id="rId19"/>
+    <p:sldId id="339" r:id="rId20"/>
+    <p:sldId id="340" r:id="rId21"/>
+    <p:sldId id="341" r:id="rId22"/>
+    <p:sldId id="342" r:id="rId23"/>
+    <p:sldId id="343" r:id="rId24"/>
+    <p:sldId id="344" r:id="rId25"/>
+    <p:sldId id="345" r:id="rId26"/>
+    <p:sldId id="346" r:id="rId27"/>
+    <p:sldId id="347" r:id="rId28"/>
+    <p:sldId id="348" r:id="rId29"/>
+    <p:sldId id="351" r:id="rId30"/>
+    <p:sldId id="350" r:id="rId31"/>
+    <p:sldId id="284" r:id="rId32"/>
   </p:sldIdLst>
   <p:sldSz cx="9144000" cy="6858000" type="screen4x3"/>
   <p:notesSz cx="7010400" cy="9296400"/>
@@ -825,6 +826,91 @@
             <a:fld id="{55ECFD52-9CA0-4306-99FC-201DA20A9336}" type="slidenum">
               <a:rPr lang="en-US" smtClean="0"/>
               <a:pPr/>
+              <a:t>14</a:t>
+            </a:fld>
+            <a:endParaRPr lang="en-US"/>
+          </a:p>
+        </p:txBody>
+      </p:sp>
+    </p:spTree>
+    <p:extLst>
+      <p:ext uri="{BB962C8B-B14F-4D97-AF65-F5344CB8AC3E}">
+        <p14:creationId xmlns:p14="http://schemas.microsoft.com/office/powerpoint/2010/main" val="3861464280"/>
+      </p:ext>
+    </p:extLst>
+  </p:cSld>
+  <p:clrMapOvr>
+    <a:masterClrMapping/>
+  </p:clrMapOvr>
+</p:notes>
+</file>
+
+<file path=ppt/notesSlides/notesSlide2.xml><?xml version="1.0" encoding="utf-8"?>
+<p:notes xmlns:a="http://schemas.openxmlformats.org/drawingml/2006/main" xmlns:r="http://schemas.openxmlformats.org/officeDocument/2006/relationships" xmlns:p="http://schemas.openxmlformats.org/presentationml/2006/main">
+  <p:cSld>
+    <p:spTree>
+      <p:nvGrpSpPr>
+        <p:cNvPr id="1" name=""/>
+        <p:cNvGrpSpPr/>
+        <p:nvPr/>
+      </p:nvGrpSpPr>
+      <p:grpSpPr>
+        <a:xfrm>
+          <a:off x="0" y="0"/>
+          <a:ext cx="0" cy="0"/>
+          <a:chOff x="0" y="0"/>
+          <a:chExt cx="0" cy="0"/>
+        </a:xfrm>
+      </p:grpSpPr>
+      <p:sp>
+        <p:nvSpPr>
+          <p:cNvPr id="2" name="Slide Image Placeholder 1"/>
+          <p:cNvSpPr>
+            <a:spLocks noGrp="1" noRot="1" noChangeAspect="1"/>
+          </p:cNvSpPr>
+          <p:nvPr>
+            <p:ph type="sldImg"/>
+          </p:nvPr>
+        </p:nvSpPr>
+        <p:spPr/>
+      </p:sp>
+      <p:sp>
+        <p:nvSpPr>
+          <p:cNvPr id="3" name="Notes Placeholder 2"/>
+          <p:cNvSpPr>
+            <a:spLocks noGrp="1"/>
+          </p:cNvSpPr>
+          <p:nvPr>
+            <p:ph type="body" idx="1"/>
+          </p:nvPr>
+        </p:nvSpPr>
+        <p:spPr/>
+        <p:txBody>
+          <a:bodyPr/>
+          <a:lstStyle/>
+          <a:p>
+            <a:endParaRPr lang="en-US" dirty="0"/>
+          </a:p>
+        </p:txBody>
+      </p:sp>
+      <p:sp>
+        <p:nvSpPr>
+          <p:cNvPr id="4" name="Slide Number Placeholder 3"/>
+          <p:cNvSpPr>
+            <a:spLocks noGrp="1"/>
+          </p:cNvSpPr>
+          <p:nvPr>
+            <p:ph type="sldNum" sz="quarter" idx="10"/>
+          </p:nvPr>
+        </p:nvSpPr>
+        <p:spPr/>
+        <p:txBody>
+          <a:bodyPr/>
+          <a:lstStyle/>
+          <a:p>
+            <a:fld id="{55ECFD52-9CA0-4306-99FC-201DA20A9336}" type="slidenum">
+              <a:rPr lang="en-US" smtClean="0"/>
+              <a:pPr/>
               <a:t>17</a:t>
             </a:fld>
             <a:endParaRPr lang="en-US"/>
@@ -844,7 +930,7 @@
 </p:notes>
 </file>
 
-<file path=ppt/notesSlides/notesSlide2.xml><?xml version="1.0" encoding="utf-8"?>
+<file path=ppt/notesSlides/notesSlide3.xml><?xml version="1.0" encoding="utf-8"?>
 <p:notes xmlns:a="http://schemas.openxmlformats.org/drawingml/2006/main" xmlns:r="http://schemas.openxmlformats.org/officeDocument/2006/relationships" xmlns:p="http://schemas.openxmlformats.org/presentationml/2006/main">
   <p:cSld>
     <p:spTree>
@@ -929,7 +1015,7 @@
 </p:notes>
 </file>
 
-<file path=ppt/notesSlides/notesSlide3.xml><?xml version="1.0" encoding="utf-8"?>
+<file path=ppt/notesSlides/notesSlide4.xml><?xml version="1.0" encoding="utf-8"?>
 <p:notes xmlns:a="http://schemas.openxmlformats.org/drawingml/2006/main" xmlns:r="http://schemas.openxmlformats.org/officeDocument/2006/relationships" xmlns:p="http://schemas.openxmlformats.org/presentationml/2006/main">
   <p:cSld>
     <p:spTree>
@@ -1021,7 +1107,7 @@
 </p:notes>
 </file>
 
-<file path=ppt/notesSlides/notesSlide4.xml><?xml version="1.0" encoding="utf-8"?>
+<file path=ppt/notesSlides/notesSlide5.xml><?xml version="1.0" encoding="utf-8"?>
 <p:notes xmlns:a="http://schemas.openxmlformats.org/drawingml/2006/main" xmlns:r="http://schemas.openxmlformats.org/officeDocument/2006/relationships" xmlns:p="http://schemas.openxmlformats.org/presentationml/2006/main">
   <p:cSld>
     <p:spTree>
@@ -1096,7 +1182,7 @@
     </p:spTree>
     <p:extLst>
       <p:ext uri="{BB962C8B-B14F-4D97-AF65-F5344CB8AC3E}">
-        <p14:creationId xmlns:p14="http://schemas.microsoft.com/office/powerpoint/2010/main" val="3861464280"/>
+        <p14:creationId xmlns:p14="http://schemas.microsoft.com/office/powerpoint/2010/main" val="1712190798"/>
       </p:ext>
     </p:extLst>
   </p:cSld>
@@ -33575,7 +33661,7 @@
             <a:fld id="{4B4332F1-BAE3-4172-AA6D-91F763B329EF}" type="slidenum">
               <a:rPr lang="en-US" smtClean="0"/>
               <a:pPr/>
-              <a:t>10</a:t>
+              <a:t>9</a:t>
             </a:fld>
             <a:endParaRPr lang="en-US"/>
           </a:p>
@@ -33801,7 +33887,7 @@
             <a:fld id="{4B4332F1-BAE3-4172-AA6D-91F763B329EF}" type="slidenum">
               <a:rPr lang="en-US" smtClean="0"/>
               <a:pPr/>
-              <a:t>11</a:t>
+              <a:t>10</a:t>
             </a:fld>
             <a:endParaRPr lang="en-US"/>
           </a:p>
@@ -33883,7 +33969,7 @@
             <a:fld id="{4B4332F1-BAE3-4172-AA6D-91F763B329EF}" type="slidenum">
               <a:rPr lang="en-US" smtClean="0"/>
               <a:pPr/>
-              <a:t>12</a:t>
+              <a:t>11</a:t>
             </a:fld>
             <a:endParaRPr lang="en-US"/>
           </a:p>
@@ -34181,6 +34267,36 @@
               </a:solidFill>
               <a:latin typeface="Lucida Console" panose="020B0609040504020204" pitchFamily="49" charset="0"/>
             </a:endParaRPr>
+          </a:p>
+        </p:txBody>
+      </p:sp>
+      <p:sp>
+        <p:nvSpPr>
+          <p:cNvPr id="6" name="Slide Number Placeholder 5">
+            <a:extLst>
+              <a:ext uri="{FF2B5EF4-FFF2-40B4-BE49-F238E27FC236}">
+                <a16:creationId xmlns:a16="http://schemas.microsoft.com/office/drawing/2014/main" id="{487B61D2-940F-10B2-1A11-B88CC23092B6}"/>
+              </a:ext>
+            </a:extLst>
+          </p:cNvPr>
+          <p:cNvSpPr>
+            <a:spLocks noGrp="1"/>
+          </p:cNvSpPr>
+          <p:nvPr>
+            <p:ph type="sldNum" sz="quarter" idx="11"/>
+          </p:nvPr>
+        </p:nvSpPr>
+        <p:spPr/>
+        <p:txBody>
+          <a:bodyPr/>
+          <a:lstStyle/>
+          <a:p>
+            <a:fld id="{4B4332F1-BAE3-4172-AA6D-91F763B329EF}" type="slidenum">
+              <a:rPr lang="en-US" smtClean="0"/>
+              <a:pPr/>
+              <a:t>12</a:t>
+            </a:fld>
+            <a:endParaRPr lang="en-US"/>
           </a:p>
         </p:txBody>
       </p:sp>
@@ -34443,6 +34559,36 @@
           </p:sp>
         </mc:Fallback>
       </mc:AlternateContent>
+      <p:sp>
+        <p:nvSpPr>
+          <p:cNvPr id="4" name="Slide Number Placeholder 3">
+            <a:extLst>
+              <a:ext uri="{FF2B5EF4-FFF2-40B4-BE49-F238E27FC236}">
+                <a16:creationId xmlns:a16="http://schemas.microsoft.com/office/drawing/2014/main" id="{B6622E25-B339-BCC7-C841-A2DC34702A0A}"/>
+              </a:ext>
+            </a:extLst>
+          </p:cNvPr>
+          <p:cNvSpPr>
+            <a:spLocks noGrp="1"/>
+          </p:cNvSpPr>
+          <p:nvPr>
+            <p:ph type="sldNum" sz="quarter" idx="11"/>
+          </p:nvPr>
+        </p:nvSpPr>
+        <p:spPr/>
+        <p:txBody>
+          <a:bodyPr/>
+          <a:lstStyle/>
+          <a:p>
+            <a:fld id="{4B4332F1-BAE3-4172-AA6D-91F763B329EF}" type="slidenum">
+              <a:rPr lang="en-US" smtClean="0"/>
+              <a:pPr/>
+              <a:t>13</a:t>
+            </a:fld>
+            <a:endParaRPr lang="en-US"/>
+          </a:p>
+        </p:txBody>
+      </p:sp>
     </p:spTree>
     <p:extLst>
       <p:ext uri="{BB962C8B-B14F-4D97-AF65-F5344CB8AC3E}">
@@ -34457,6 +34603,274 @@
 </file>
 
 <file path=ppt/slides/slide15.xml><?xml version="1.0" encoding="utf-8"?>
+<p:sld xmlns:a="http://schemas.openxmlformats.org/drawingml/2006/main" xmlns:r="http://schemas.openxmlformats.org/officeDocument/2006/relationships" xmlns:p="http://schemas.openxmlformats.org/presentationml/2006/main">
+  <p:cSld>
+    <p:spTree>
+      <p:nvGrpSpPr>
+        <p:cNvPr id="1" name=""/>
+        <p:cNvGrpSpPr/>
+        <p:nvPr/>
+      </p:nvGrpSpPr>
+      <p:grpSpPr>
+        <a:xfrm>
+          <a:off x="0" y="0"/>
+          <a:ext cx="0" cy="0"/>
+          <a:chOff x="0" y="0"/>
+          <a:chExt cx="0" cy="0"/>
+        </a:xfrm>
+      </p:grpSpPr>
+      <p:sp>
+        <p:nvSpPr>
+          <p:cNvPr id="2" name="Title 1"/>
+          <p:cNvSpPr>
+            <a:spLocks noGrp="1"/>
+          </p:cNvSpPr>
+          <p:nvPr>
+            <p:ph type="title"/>
+          </p:nvPr>
+        </p:nvSpPr>
+        <p:spPr/>
+        <p:txBody>
+          <a:bodyPr/>
+          <a:lstStyle/>
+          <a:p>
+            <a:r>
+              <a:rPr lang="en-US" dirty="0"/>
+              <a:t>Exercises</a:t>
+            </a:r>
+          </a:p>
+        </p:txBody>
+      </p:sp>
+      <p:sp>
+        <p:nvSpPr>
+          <p:cNvPr id="3" name="Content Placeholder 2"/>
+          <p:cNvSpPr>
+            <a:spLocks noGrp="1"/>
+          </p:cNvSpPr>
+          <p:nvPr>
+            <p:ph idx="1"/>
+          </p:nvPr>
+        </p:nvSpPr>
+        <p:spPr/>
+        <p:txBody>
+          <a:bodyPr/>
+          <a:lstStyle/>
+          <a:p>
+            <a:r>
+              <a:rPr lang="en-US" dirty="0"/>
+              <a:t>Exercise 1_sample_Function.xml, </a:t>
+            </a:r>
+            <a:r>
+              <a:rPr lang="en-US" b="1" dirty="0"/>
+              <a:t>objective: </a:t>
+            </a:r>
+            <a:r>
+              <a:rPr lang="en-US" dirty="0"/>
+              <a:t>prepare the training data via forward sampling.</a:t>
+            </a:r>
+          </a:p>
+          <a:p>
+            <a:pPr lvl="1"/>
+            <a:r>
+              <a:rPr lang="en-US" dirty="0"/>
+              <a:t>Just run this one</a:t>
+            </a:r>
+          </a:p>
+          <a:p>
+            <a:r>
+              <a:rPr lang="en-US" dirty="0"/>
+              <a:t>Exercise 2_train_rom.xml, </a:t>
+            </a:r>
+            <a:r>
+              <a:rPr lang="en-US" b="1" dirty="0"/>
+              <a:t>objective</a:t>
+            </a:r>
+            <a:r>
+              <a:rPr lang="en-US" dirty="0"/>
+              <a:t>: Construct/train a ROM. </a:t>
+            </a:r>
+          </a:p>
+          <a:p>
+            <a:pPr lvl="1"/>
+            <a:r>
+              <a:rPr lang="en-US" dirty="0"/>
+              <a:t>Add a </a:t>
+            </a:r>
+            <a:r>
+              <a:rPr lang="en-US" dirty="0" err="1"/>
+              <a:t>RomTrainer</a:t>
+            </a:r>
+            <a:r>
+              <a:rPr lang="en-US" dirty="0"/>
+              <a:t> Step</a:t>
+            </a:r>
+          </a:p>
+          <a:p>
+            <a:r>
+              <a:rPr lang="en-US" dirty="0"/>
+              <a:t>Exercise 3_pickle_rom.xml, </a:t>
+            </a:r>
+            <a:r>
+              <a:rPr lang="en-US" b="1" dirty="0"/>
+              <a:t>objective:</a:t>
+            </a:r>
+            <a:r>
+              <a:rPr lang="en-US" dirty="0"/>
+              <a:t> Save a ROM for future use. </a:t>
+            </a:r>
+            <a:endParaRPr lang="en-US" b="1" dirty="0"/>
+          </a:p>
+          <a:p>
+            <a:pPr lvl="1"/>
+            <a:r>
+              <a:rPr lang="en-US" dirty="0"/>
+              <a:t>Use </a:t>
+            </a:r>
+            <a:r>
+              <a:rPr lang="en-US" dirty="0" err="1"/>
+              <a:t>IOStep</a:t>
+            </a:r>
+            <a:r>
+              <a:rPr lang="en-US" dirty="0"/>
+              <a:t> to </a:t>
+            </a:r>
+            <a:r>
+              <a:rPr lang="en-US" dirty="0" err="1"/>
+              <a:t>picke</a:t>
+            </a:r>
+            <a:r>
+              <a:rPr lang="en-US" dirty="0"/>
+              <a:t> a ROM</a:t>
+            </a:r>
+          </a:p>
+          <a:p>
+            <a:r>
+              <a:rPr lang="en-US" dirty="0"/>
+              <a:t>Exercise 4_load_rom.xml, </a:t>
+            </a:r>
+            <a:r>
+              <a:rPr lang="en-US" b="1" dirty="0"/>
+              <a:t>objective: </a:t>
+            </a:r>
+            <a:r>
+              <a:rPr lang="en-US" dirty="0"/>
+              <a:t>load a previously trained ROM</a:t>
+            </a:r>
+            <a:endParaRPr lang="en-US" b="1" dirty="0"/>
+          </a:p>
+          <a:p>
+            <a:pPr lvl="1"/>
+            <a:r>
+              <a:rPr lang="en-US" dirty="0"/>
+              <a:t>Use </a:t>
+            </a:r>
+            <a:r>
+              <a:rPr lang="en-US" dirty="0" err="1"/>
+              <a:t>IOStep</a:t>
+            </a:r>
+            <a:r>
+              <a:rPr lang="en-US" dirty="0"/>
+              <a:t> to load a ROM</a:t>
+            </a:r>
+          </a:p>
+          <a:p>
+            <a:r>
+              <a:rPr lang="en-US" dirty="0"/>
+              <a:t>Exercise 5_sample_rom.xml, </a:t>
+            </a:r>
+            <a:r>
+              <a:rPr lang="en-US" b="1" dirty="0"/>
+              <a:t>objective:</a:t>
+            </a:r>
+            <a:r>
+              <a:rPr lang="en-US" dirty="0"/>
+              <a:t> Sample/evaluate a ROM immediately after training.</a:t>
+            </a:r>
+          </a:p>
+          <a:p>
+            <a:pPr lvl="1"/>
+            <a:r>
+              <a:rPr lang="en-US" dirty="0"/>
+              <a:t>Use </a:t>
+            </a:r>
+            <a:r>
+              <a:rPr lang="en-US" dirty="0" err="1"/>
+              <a:t>MultiRun</a:t>
+            </a:r>
+            <a:r>
+              <a:rPr lang="en-US" dirty="0"/>
+              <a:t> to sample a ROM</a:t>
+            </a:r>
+          </a:p>
+          <a:p>
+            <a:r>
+              <a:rPr lang="en-US" dirty="0"/>
+              <a:t>Exercise 6_sample_prom.xml, </a:t>
+            </a:r>
+            <a:r>
+              <a:rPr lang="en-US" b="1" dirty="0"/>
+              <a:t>objective:</a:t>
+            </a:r>
+            <a:r>
+              <a:rPr lang="en-US" dirty="0"/>
+              <a:t> Sample a previously pickled ROM :</a:t>
+            </a:r>
+          </a:p>
+          <a:p>
+            <a:pPr lvl="1"/>
+            <a:r>
+              <a:rPr lang="en-US" dirty="0"/>
+              <a:t>Use </a:t>
+            </a:r>
+            <a:r>
+              <a:rPr lang="en-US" dirty="0" err="1"/>
+              <a:t>MultiRun</a:t>
+            </a:r>
+            <a:r>
+              <a:rPr lang="en-US" dirty="0"/>
+              <a:t> to sample a pickled ROM</a:t>
+            </a:r>
+          </a:p>
+        </p:txBody>
+      </p:sp>
+      <p:sp>
+        <p:nvSpPr>
+          <p:cNvPr id="4" name="Slide Number Placeholder 3"/>
+          <p:cNvSpPr>
+            <a:spLocks noGrp="1"/>
+          </p:cNvSpPr>
+          <p:nvPr>
+            <p:ph type="sldNum" sz="quarter" idx="11"/>
+          </p:nvPr>
+        </p:nvSpPr>
+        <p:spPr/>
+        <p:txBody>
+          <a:bodyPr/>
+          <a:lstStyle/>
+          <a:p>
+            <a:fld id="{4B4332F1-BAE3-4172-AA6D-91F763B329EF}" type="slidenum">
+              <a:rPr lang="en-US" smtClean="0"/>
+              <a:pPr/>
+              <a:t>14</a:t>
+            </a:fld>
+            <a:endParaRPr lang="en-US"/>
+          </a:p>
+        </p:txBody>
+      </p:sp>
+    </p:spTree>
+    <p:extLst>
+      <p:ext uri="{BB962C8B-B14F-4D97-AF65-F5344CB8AC3E}">
+        <p14:creationId xmlns:p14="http://schemas.microsoft.com/office/powerpoint/2010/main" val="1380335453"/>
+      </p:ext>
+    </p:extLst>
+  </p:cSld>
+  <p:clrMapOvr>
+    <a:masterClrMapping/>
+  </p:clrMapOvr>
+</p:sld>
+</file>
+
+<file path=ppt/slides/slide16.xml><?xml version="1.0" encoding="utf-8"?>
 <p:sld xmlns:a="http://schemas.openxmlformats.org/drawingml/2006/main" xmlns:r="http://schemas.openxmlformats.org/officeDocument/2006/relationships" xmlns:p="http://schemas.openxmlformats.org/presentationml/2006/main">
   <p:cSld>
     <p:spTree>
@@ -35391,7 +35805,7 @@
 </p:sld>
 </file>
 
-<file path=ppt/slides/slide16.xml><?xml version="1.0" encoding="utf-8"?>
+<file path=ppt/slides/slide17.xml><?xml version="1.0" encoding="utf-8"?>
 <p:sld xmlns:a="http://schemas.openxmlformats.org/drawingml/2006/main" xmlns:r="http://schemas.openxmlformats.org/officeDocument/2006/relationships" xmlns:p="http://schemas.openxmlformats.org/presentationml/2006/main">
   <p:cSld>
     <p:spTree>
@@ -36282,7 +36696,7 @@
 </p:sld>
 </file>
 
-<file path=ppt/slides/slide17.xml><?xml version="1.0" encoding="utf-8"?>
+<file path=ppt/slides/slide18.xml><?xml version="1.0" encoding="utf-8"?>
 <p:sld xmlns:a="http://schemas.openxmlformats.org/drawingml/2006/main" xmlns:r="http://schemas.openxmlformats.org/officeDocument/2006/relationships" xmlns:p="http://schemas.openxmlformats.org/presentationml/2006/main">
   <p:cSld>
     <p:spTree>
@@ -38300,7 +38714,7 @@
 </p:sld>
 </file>
 
-<file path=ppt/slides/slide18.xml><?xml version="1.0" encoding="utf-8"?>
+<file path=ppt/slides/slide19.xml><?xml version="1.0" encoding="utf-8"?>
 <p:sld xmlns:a="http://schemas.openxmlformats.org/drawingml/2006/main" xmlns:r="http://schemas.openxmlformats.org/officeDocument/2006/relationships" xmlns:p="http://schemas.openxmlformats.org/presentationml/2006/main">
   <p:cSld>
     <p:spTree>
@@ -39194,7 +39608,171 @@
 </p:sld>
 </file>
 
-<file path=ppt/slides/slide19.xml><?xml version="1.0" encoding="utf-8"?>
+<file path=ppt/slides/slide2.xml><?xml version="1.0" encoding="utf-8"?>
+<p:sld xmlns:a="http://schemas.openxmlformats.org/drawingml/2006/main" xmlns:r="http://schemas.openxmlformats.org/officeDocument/2006/relationships" xmlns:p="http://schemas.openxmlformats.org/presentationml/2006/main">
+  <p:cSld>
+    <p:spTree>
+      <p:nvGrpSpPr>
+        <p:cNvPr id="1" name=""/>
+        <p:cNvGrpSpPr/>
+        <p:nvPr/>
+      </p:nvGrpSpPr>
+      <p:grpSpPr>
+        <a:xfrm>
+          <a:off x="0" y="0"/>
+          <a:ext cx="0" cy="0"/>
+          <a:chOff x="0" y="0"/>
+          <a:chExt cx="0" cy="0"/>
+        </a:xfrm>
+      </p:grpSpPr>
+      <p:sp>
+        <p:nvSpPr>
+          <p:cNvPr id="70658" name="Rectangle 2"/>
+          <p:cNvSpPr>
+            <a:spLocks noGrp="1" noChangeArrowheads="1"/>
+          </p:cNvSpPr>
+          <p:nvPr>
+            <p:ph type="title"/>
+          </p:nvPr>
+        </p:nvSpPr>
+        <p:spPr>
+          <a:xfrm>
+            <a:off x="455613" y="1004888"/>
+            <a:ext cx="8231187" cy="377026"/>
+          </a:xfrm>
+        </p:spPr>
+        <p:txBody>
+          <a:bodyPr/>
+          <a:lstStyle/>
+          <a:p>
+            <a:r>
+              <a:rPr lang="en-US" b="0" dirty="0"/>
+              <a:t>Outline</a:t>
+            </a:r>
+          </a:p>
+        </p:txBody>
+      </p:sp>
+      <p:sp>
+        <p:nvSpPr>
+          <p:cNvPr id="70659" name="Rectangle 3"/>
+          <p:cNvSpPr>
+            <a:spLocks noGrp="1" noChangeArrowheads="1"/>
+          </p:cNvSpPr>
+          <p:nvPr>
+            <p:ph idx="1"/>
+          </p:nvPr>
+        </p:nvSpPr>
+        <p:spPr/>
+        <p:txBody>
+          <a:bodyPr/>
+          <a:lstStyle/>
+          <a:p>
+            <a:r>
+              <a:rPr lang="en-US" dirty="0">
+                <a:solidFill>
+                  <a:srgbClr val="3366FF"/>
+                </a:solidFill>
+              </a:rPr>
+              <a:t>Brief introduction on ROMs</a:t>
+            </a:r>
+          </a:p>
+          <a:p>
+            <a:pPr marL="0" indent="0">
+              <a:buNone/>
+            </a:pPr>
+            <a:endParaRPr lang="en-US" dirty="0"/>
+          </a:p>
+          <a:p>
+            <a:r>
+              <a:rPr lang="en-US" dirty="0">
+                <a:solidFill>
+                  <a:srgbClr val="3366FF"/>
+                </a:solidFill>
+              </a:rPr>
+              <a:t>ROMs and RAVEN</a:t>
+            </a:r>
+          </a:p>
+          <a:p>
+            <a:pPr lvl="1"/>
+            <a:r>
+              <a:rPr lang="en-US" dirty="0"/>
+              <a:t>Available ROMs</a:t>
+            </a:r>
+          </a:p>
+          <a:p>
+            <a:pPr lvl="1"/>
+            <a:r>
+              <a:rPr lang="en-US" dirty="0"/>
+              <a:t>RAVEN ROM workflow</a:t>
+            </a:r>
+          </a:p>
+          <a:p>
+            <a:pPr lvl="1"/>
+            <a:endParaRPr lang="en-US" dirty="0"/>
+          </a:p>
+          <a:p>
+            <a:r>
+              <a:rPr lang="en-US" dirty="0">
+                <a:solidFill>
+                  <a:srgbClr val="3366FF"/>
+                </a:solidFill>
+              </a:rPr>
+              <a:t>RAVEN examples</a:t>
+            </a:r>
+          </a:p>
+          <a:p>
+            <a:pPr lvl="1"/>
+            <a:r>
+              <a:rPr lang="en-US" dirty="0"/>
+              <a:t>Create ROMs</a:t>
+            </a:r>
+          </a:p>
+          <a:p>
+            <a:pPr lvl="1"/>
+            <a:r>
+              <a:rPr lang="en-US" dirty="0"/>
+              <a:t>Perform sampling of ROMs</a:t>
+            </a:r>
+          </a:p>
+          <a:p>
+            <a:pPr lvl="1"/>
+            <a:endParaRPr lang="en-US" dirty="0"/>
+          </a:p>
+        </p:txBody>
+      </p:sp>
+      <p:sp>
+        <p:nvSpPr>
+          <p:cNvPr id="2" name="Slide Number Placeholder 1"/>
+          <p:cNvSpPr>
+            <a:spLocks noGrp="1"/>
+          </p:cNvSpPr>
+          <p:nvPr>
+            <p:ph type="sldNum" sz="quarter" idx="11"/>
+          </p:nvPr>
+        </p:nvSpPr>
+        <p:spPr/>
+        <p:txBody>
+          <a:bodyPr/>
+          <a:lstStyle/>
+          <a:p>
+            <a:fld id="{4B4332F1-BAE3-4172-AA6D-91F763B329EF}" type="slidenum">
+              <a:rPr lang="en-US" smtClean="0"/>
+              <a:pPr/>
+              <a:t>1</a:t>
+            </a:fld>
+            <a:endParaRPr lang="en-US"/>
+          </a:p>
+        </p:txBody>
+      </p:sp>
+    </p:spTree>
+  </p:cSld>
+  <p:clrMapOvr>
+    <a:masterClrMapping/>
+  </p:clrMapOvr>
+</p:sld>
+</file>
+
+<file path=ppt/slides/slide20.xml><?xml version="1.0" encoding="utf-8"?>
 <p:sld xmlns:a="http://schemas.openxmlformats.org/drawingml/2006/main" xmlns:r="http://schemas.openxmlformats.org/officeDocument/2006/relationships" xmlns:p="http://schemas.openxmlformats.org/presentationml/2006/main">
   <p:cSld>
     <p:spTree>
@@ -40131,171 +40709,7 @@
 </p:sld>
 </file>
 
-<file path=ppt/slides/slide2.xml><?xml version="1.0" encoding="utf-8"?>
-<p:sld xmlns:a="http://schemas.openxmlformats.org/drawingml/2006/main" xmlns:r="http://schemas.openxmlformats.org/officeDocument/2006/relationships" xmlns:p="http://schemas.openxmlformats.org/presentationml/2006/main">
-  <p:cSld>
-    <p:spTree>
-      <p:nvGrpSpPr>
-        <p:cNvPr id="1" name=""/>
-        <p:cNvGrpSpPr/>
-        <p:nvPr/>
-      </p:nvGrpSpPr>
-      <p:grpSpPr>
-        <a:xfrm>
-          <a:off x="0" y="0"/>
-          <a:ext cx="0" cy="0"/>
-          <a:chOff x="0" y="0"/>
-          <a:chExt cx="0" cy="0"/>
-        </a:xfrm>
-      </p:grpSpPr>
-      <p:sp>
-        <p:nvSpPr>
-          <p:cNvPr id="70658" name="Rectangle 2"/>
-          <p:cNvSpPr>
-            <a:spLocks noGrp="1" noChangeArrowheads="1"/>
-          </p:cNvSpPr>
-          <p:nvPr>
-            <p:ph type="title"/>
-          </p:nvPr>
-        </p:nvSpPr>
-        <p:spPr>
-          <a:xfrm>
-            <a:off x="455613" y="1004888"/>
-            <a:ext cx="8231187" cy="377026"/>
-          </a:xfrm>
-        </p:spPr>
-        <p:txBody>
-          <a:bodyPr/>
-          <a:lstStyle/>
-          <a:p>
-            <a:r>
-              <a:rPr lang="en-US" b="0" dirty="0"/>
-              <a:t>Outline</a:t>
-            </a:r>
-          </a:p>
-        </p:txBody>
-      </p:sp>
-      <p:sp>
-        <p:nvSpPr>
-          <p:cNvPr id="70659" name="Rectangle 3"/>
-          <p:cNvSpPr>
-            <a:spLocks noGrp="1" noChangeArrowheads="1"/>
-          </p:cNvSpPr>
-          <p:nvPr>
-            <p:ph idx="1"/>
-          </p:nvPr>
-        </p:nvSpPr>
-        <p:spPr/>
-        <p:txBody>
-          <a:bodyPr/>
-          <a:lstStyle/>
-          <a:p>
-            <a:r>
-              <a:rPr lang="en-US" dirty="0">
-                <a:solidFill>
-                  <a:srgbClr val="3366FF"/>
-                </a:solidFill>
-              </a:rPr>
-              <a:t>Brief introduction on ROMs</a:t>
-            </a:r>
-          </a:p>
-          <a:p>
-            <a:pPr marL="0" indent="0">
-              <a:buNone/>
-            </a:pPr>
-            <a:endParaRPr lang="en-US" dirty="0"/>
-          </a:p>
-          <a:p>
-            <a:r>
-              <a:rPr lang="en-US" dirty="0">
-                <a:solidFill>
-                  <a:srgbClr val="3366FF"/>
-                </a:solidFill>
-              </a:rPr>
-              <a:t>ROMs and RAVEN</a:t>
-            </a:r>
-          </a:p>
-          <a:p>
-            <a:pPr lvl="1"/>
-            <a:r>
-              <a:rPr lang="en-US" dirty="0"/>
-              <a:t>Available ROMs</a:t>
-            </a:r>
-          </a:p>
-          <a:p>
-            <a:pPr lvl="1"/>
-            <a:r>
-              <a:rPr lang="en-US" dirty="0"/>
-              <a:t>RAVEN ROM workflow</a:t>
-            </a:r>
-          </a:p>
-          <a:p>
-            <a:pPr lvl="1"/>
-            <a:endParaRPr lang="en-US" dirty="0"/>
-          </a:p>
-          <a:p>
-            <a:r>
-              <a:rPr lang="en-US" dirty="0">
-                <a:solidFill>
-                  <a:srgbClr val="3366FF"/>
-                </a:solidFill>
-              </a:rPr>
-              <a:t>RAVEN examples</a:t>
-            </a:r>
-          </a:p>
-          <a:p>
-            <a:pPr lvl="1"/>
-            <a:r>
-              <a:rPr lang="en-US" dirty="0"/>
-              <a:t>Create ROMs</a:t>
-            </a:r>
-          </a:p>
-          <a:p>
-            <a:pPr lvl="1"/>
-            <a:r>
-              <a:rPr lang="en-US" dirty="0"/>
-              <a:t>Perform sampling of ROMs</a:t>
-            </a:r>
-          </a:p>
-          <a:p>
-            <a:pPr lvl="1"/>
-            <a:endParaRPr lang="en-US" dirty="0"/>
-          </a:p>
-        </p:txBody>
-      </p:sp>
-      <p:sp>
-        <p:nvSpPr>
-          <p:cNvPr id="2" name="Slide Number Placeholder 1"/>
-          <p:cNvSpPr>
-            <a:spLocks noGrp="1"/>
-          </p:cNvSpPr>
-          <p:nvPr>
-            <p:ph type="sldNum" sz="quarter" idx="11"/>
-          </p:nvPr>
-        </p:nvSpPr>
-        <p:spPr/>
-        <p:txBody>
-          <a:bodyPr/>
-          <a:lstStyle/>
-          <a:p>
-            <a:fld id="{4B4332F1-BAE3-4172-AA6D-91F763B329EF}" type="slidenum">
-              <a:rPr lang="en-US" smtClean="0"/>
-              <a:pPr/>
-              <a:t>2</a:t>
-            </a:fld>
-            <a:endParaRPr lang="en-US"/>
-          </a:p>
-        </p:txBody>
-      </p:sp>
-    </p:spTree>
-  </p:cSld>
-  <p:clrMapOvr>
-    <a:masterClrMapping/>
-  </p:clrMapOvr>
-</p:sld>
-</file>
-
-<file path=ppt/slides/slide20.xml><?xml version="1.0" encoding="utf-8"?>
+<file path=ppt/slides/slide21.xml><?xml version="1.0" encoding="utf-8"?>
 <p:sld xmlns:a="http://schemas.openxmlformats.org/drawingml/2006/main" xmlns:r="http://schemas.openxmlformats.org/officeDocument/2006/relationships" xmlns:p="http://schemas.openxmlformats.org/presentationml/2006/main">
   <p:cSld>
     <p:spTree>
@@ -41635,7 +42049,7 @@
 </p:sld>
 </file>
 
-<file path=ppt/slides/slide21.xml><?xml version="1.0" encoding="utf-8"?>
+<file path=ppt/slides/slide22.xml><?xml version="1.0" encoding="utf-8"?>
 <p:sld xmlns:a="http://schemas.openxmlformats.org/drawingml/2006/main" xmlns:r="http://schemas.openxmlformats.org/officeDocument/2006/relationships" xmlns:p="http://schemas.openxmlformats.org/presentationml/2006/main">
   <p:cSld>
     <p:spTree>
@@ -43544,7 +43958,7 @@
 </p:sld>
 </file>
 
-<file path=ppt/slides/slide22.xml><?xml version="1.0" encoding="utf-8"?>
+<file path=ppt/slides/slide23.xml><?xml version="1.0" encoding="utf-8"?>
 <p:sld xmlns:a="http://schemas.openxmlformats.org/drawingml/2006/main" xmlns:r="http://schemas.openxmlformats.org/officeDocument/2006/relationships" xmlns:p="http://schemas.openxmlformats.org/presentationml/2006/main">
   <p:cSld>
     <p:spTree>
@@ -44435,7 +44849,7 @@
 </p:sld>
 </file>
 
-<file path=ppt/slides/slide23.xml><?xml version="1.0" encoding="utf-8"?>
+<file path=ppt/slides/slide24.xml><?xml version="1.0" encoding="utf-8"?>
 <p:sld xmlns:a="http://schemas.openxmlformats.org/drawingml/2006/main" xmlns:r="http://schemas.openxmlformats.org/officeDocument/2006/relationships" xmlns:p="http://schemas.openxmlformats.org/presentationml/2006/main">
   <p:cSld>
     <p:spTree>
@@ -45525,7 +45939,7 @@
 </p:sld>
 </file>
 
-<file path=ppt/slides/slide24.xml><?xml version="1.0" encoding="utf-8"?>
+<file path=ppt/slides/slide25.xml><?xml version="1.0" encoding="utf-8"?>
 <p:sld xmlns:a="http://schemas.openxmlformats.org/drawingml/2006/main" xmlns:r="http://schemas.openxmlformats.org/officeDocument/2006/relationships" xmlns:p="http://schemas.openxmlformats.org/presentationml/2006/main">
   <p:cSld>
     <p:spTree>
@@ -47289,7 +47703,7 @@
 </p:sld>
 </file>
 
-<file path=ppt/slides/slide25.xml><?xml version="1.0" encoding="utf-8"?>
+<file path=ppt/slides/slide26.xml><?xml version="1.0" encoding="utf-8"?>
 <p:sld xmlns:a="http://schemas.openxmlformats.org/drawingml/2006/main" xmlns:r="http://schemas.openxmlformats.org/officeDocument/2006/relationships" xmlns:p="http://schemas.openxmlformats.org/presentationml/2006/main">
   <p:cSld>
     <p:spTree>
@@ -48183,7 +48597,7 @@
 </p:sld>
 </file>
 
-<file path=ppt/slides/slide26.xml><?xml version="1.0" encoding="utf-8"?>
+<file path=ppt/slides/slide27.xml><?xml version="1.0" encoding="utf-8"?>
 <p:sld xmlns:a="http://schemas.openxmlformats.org/drawingml/2006/main" xmlns:r="http://schemas.openxmlformats.org/officeDocument/2006/relationships" xmlns:p="http://schemas.openxmlformats.org/presentationml/2006/main">
   <p:cSld>
     <p:spTree>
@@ -49346,7 +49760,7 @@
 </p:sld>
 </file>
 
-<file path=ppt/slides/slide27.xml><?xml version="1.0" encoding="utf-8"?>
+<file path=ppt/slides/slide28.xml><?xml version="1.0" encoding="utf-8"?>
 <p:sld xmlns:a="http://schemas.openxmlformats.org/drawingml/2006/main" xmlns:r="http://schemas.openxmlformats.org/officeDocument/2006/relationships" xmlns:p="http://schemas.openxmlformats.org/presentationml/2006/main">
   <p:cSld>
     <p:spTree>
@@ -51016,7 +51430,7 @@
 </p:sld>
 </file>
 
-<file path=ppt/slides/slide28.xml><?xml version="1.0" encoding="utf-8"?>
+<file path=ppt/slides/slide29.xml><?xml version="1.0" encoding="utf-8"?>
 <p:sld xmlns:a="http://schemas.openxmlformats.org/drawingml/2006/main" xmlns:r="http://schemas.openxmlformats.org/officeDocument/2006/relationships" xmlns:p="http://schemas.openxmlformats.org/presentationml/2006/main">
   <p:cSld>
     <p:spTree>
@@ -51072,162 +51486,56 @@
           <a:p>
             <a:r>
               <a:rPr lang="en-US" dirty="0"/>
-              <a:t>Construct a ROM: 2_train_rom.xml</a:t>
+              <a:t>Exercise 7_evaluate_rom.xml, </a:t>
+            </a:r>
+            <a:r>
+              <a:rPr lang="en-US" b="1" dirty="0"/>
+              <a:t>objective: </a:t>
+            </a:r>
+            <a:r>
+              <a:rPr lang="en-US" dirty="0"/>
+              <a:t>Evaluate a ROM: </a:t>
             </a:r>
           </a:p>
           <a:p>
             <a:pPr lvl="1"/>
             <a:r>
               <a:rPr lang="en-US" dirty="0"/>
-              <a:t>Add a </a:t>
+              <a:t>Add additional </a:t>
             </a:r>
             <a:r>
               <a:rPr lang="en-US" dirty="0" err="1"/>
-              <a:t>RomTrainer</a:t>
+              <a:t>MonteCarlo</a:t>
             </a:r>
             <a:r>
               <a:rPr lang="en-US" dirty="0"/>
-              <a:t> Step</a:t>
-            </a:r>
-          </a:p>
-          <a:p>
-            <a:r>
-              <a:rPr lang="en-US" dirty="0"/>
-              <a:t>Pickle a ROM: 3_pickle_rom.xml</a:t>
+              <a:t> Sampler to evaluate a ROM</a:t>
             </a:r>
           </a:p>
           <a:p>
             <a:pPr lvl="1"/>
             <a:r>
               <a:rPr lang="en-US" dirty="0"/>
-              <a:t>Use </a:t>
-            </a:r>
-            <a:r>
-              <a:rPr lang="en-US" dirty="0" err="1"/>
-              <a:t>IOStep</a:t>
-            </a:r>
-            <a:r>
-              <a:rPr lang="en-US" dirty="0"/>
-              <a:t> to </a:t>
-            </a:r>
-            <a:r>
-              <a:rPr lang="en-US" dirty="0" err="1"/>
-              <a:t>picke</a:t>
-            </a:r>
-            <a:r>
-              <a:rPr lang="en-US" dirty="0"/>
-              <a:t> a ROM</a:t>
+              <a:t>Change the number of samples: 20, 100, 200, 1000</a:t>
             </a:r>
           </a:p>
           <a:p>
             <a:r>
+              <a:rPr lang="en-US" dirty="0" err="1"/>
+              <a:t>SciKitLearn</a:t>
+            </a:r>
+            <a:r>
               <a:rPr lang="en-US" dirty="0"/>
-              <a:t>Load a ROM: 4_load_rom.xml</a:t>
+              <a:t> Rom: Linear Regression</a:t>
             </a:r>
           </a:p>
           <a:p>
-            <a:pPr lvl="1"/>
             <a:r>
               <a:rPr lang="en-US" dirty="0"/>
-              <a:t>Use </a:t>
-            </a:r>
-            <a:r>
-              <a:rPr lang="en-US" dirty="0" err="1"/>
-              <a:t>IOStep</a:t>
-            </a:r>
-            <a:r>
-              <a:rPr lang="en-US" dirty="0"/>
-              <a:t> to load a ROM</a:t>
+              <a:t>Generalized Polynomial Chaos</a:t>
             </a:r>
           </a:p>
           <a:p>
-            <a:r>
-              <a:rPr lang="en-US" dirty="0"/>
-              <a:t>Sample a ROM: 5_sample_rom.xml</a:t>
-            </a:r>
-          </a:p>
-          <a:p>
-            <a:pPr lvl="1"/>
-            <a:r>
-              <a:rPr lang="en-US" dirty="0"/>
-              <a:t>Use </a:t>
-            </a:r>
-            <a:r>
-              <a:rPr lang="en-US" dirty="0" err="1"/>
-              <a:t>MultiRun</a:t>
-            </a:r>
-            <a:r>
-              <a:rPr lang="en-US" dirty="0"/>
-              <a:t> to sample a ROM</a:t>
-            </a:r>
-          </a:p>
-          <a:p>
-            <a:r>
-              <a:rPr lang="en-US" dirty="0"/>
-              <a:t>Sample a loaded ROM: 6_sample_prom.xml</a:t>
-            </a:r>
-          </a:p>
-          <a:p>
-            <a:pPr lvl="1"/>
-            <a:r>
-              <a:rPr lang="en-US" dirty="0"/>
-              <a:t>Use </a:t>
-            </a:r>
-            <a:r>
-              <a:rPr lang="en-US" dirty="0" err="1"/>
-              <a:t>MultiRun</a:t>
-            </a:r>
-            <a:r>
-              <a:rPr lang="en-US" dirty="0"/>
-              <a:t> to sample a pickled ROM</a:t>
-            </a:r>
-          </a:p>
-          <a:p>
-            <a:r>
-              <a:rPr lang="en-US" dirty="0"/>
-              <a:t>Evaluate a ROM: 7_evaluate_rom.xml</a:t>
-            </a:r>
-          </a:p>
-          <a:p>
-            <a:pPr lvl="1"/>
-            <a:r>
-              <a:rPr lang="en-US" dirty="0"/>
-              <a:t>Add additional </a:t>
-            </a:r>
-            <a:r>
-              <a:rPr lang="en-US" dirty="0" err="1"/>
-              <a:t>MonteCarlo</a:t>
-            </a:r>
-            <a:r>
-              <a:rPr lang="en-US" dirty="0"/>
-              <a:t> Sampler to evaluate a ROM</a:t>
-            </a:r>
-          </a:p>
-          <a:p>
-            <a:pPr lvl="1"/>
-            <a:r>
-              <a:rPr lang="en-US" dirty="0"/>
-              <a:t>Change the number of samples: 20, 100, 200, 1000</a:t>
-            </a:r>
-          </a:p>
-          <a:p>
-            <a:r>
-              <a:rPr lang="en-US" dirty="0" err="1"/>
-              <a:t>SciKitLearn</a:t>
-            </a:r>
-            <a:r>
-              <a:rPr lang="en-US" dirty="0"/>
-              <a:t> Rom: Linear Regression</a:t>
-            </a:r>
-          </a:p>
-          <a:p>
-            <a:r>
-              <a:rPr lang="en-US" dirty="0"/>
-              <a:t>Generalized Polynomial Chaos</a:t>
-            </a:r>
-          </a:p>
-          <a:p>
-            <a:pPr lvl="1"/>
             <a:endParaRPr lang="en-US" dirty="0"/>
           </a:p>
         </p:txBody>
@@ -51259,157 +51567,7 @@
     </p:spTree>
     <p:extLst>
       <p:ext uri="{BB962C8B-B14F-4D97-AF65-F5344CB8AC3E}">
-        <p14:creationId xmlns:p14="http://schemas.microsoft.com/office/powerpoint/2010/main" val="1380335453"/>
-      </p:ext>
-    </p:extLst>
-  </p:cSld>
-  <p:clrMapOvr>
-    <a:masterClrMapping/>
-  </p:clrMapOvr>
-</p:sld>
-</file>
-
-<file path=ppt/slides/slide29.xml><?xml version="1.0" encoding="utf-8"?>
-<p:sld xmlns:a="http://schemas.openxmlformats.org/drawingml/2006/main" xmlns:r="http://schemas.openxmlformats.org/officeDocument/2006/relationships" xmlns:p="http://schemas.openxmlformats.org/presentationml/2006/main">
-  <p:cSld>
-    <p:spTree>
-      <p:nvGrpSpPr>
-        <p:cNvPr id="1" name=""/>
-        <p:cNvGrpSpPr/>
-        <p:nvPr/>
-      </p:nvGrpSpPr>
-      <p:grpSpPr>
-        <a:xfrm>
-          <a:off x="0" y="0"/>
-          <a:ext cx="0" cy="0"/>
-          <a:chOff x="0" y="0"/>
-          <a:chExt cx="0" cy="0"/>
-        </a:xfrm>
-      </p:grpSpPr>
-      <p:sp>
-        <p:nvSpPr>
-          <p:cNvPr id="2" name="Title 1">
-            <a:extLst>
-              <a:ext uri="{FF2B5EF4-FFF2-40B4-BE49-F238E27FC236}">
-                <a16:creationId xmlns:a16="http://schemas.microsoft.com/office/drawing/2014/main" id="{CED2C86B-FDE4-E245-8582-7DA1BEF79C84}"/>
-              </a:ext>
-            </a:extLst>
-          </p:cNvPr>
-          <p:cNvSpPr>
-            <a:spLocks noGrp="1"/>
-          </p:cNvSpPr>
-          <p:nvPr>
-            <p:ph type="title"/>
-          </p:nvPr>
-        </p:nvSpPr>
-        <p:spPr/>
-        <p:txBody>
-          <a:bodyPr/>
-          <a:lstStyle/>
-          <a:p>
-            <a:endParaRPr lang="en-US"/>
-          </a:p>
-        </p:txBody>
-      </p:sp>
-      <p:sp>
-        <p:nvSpPr>
-          <p:cNvPr id="3" name="Content Placeholder 2">
-            <a:extLst>
-              <a:ext uri="{FF2B5EF4-FFF2-40B4-BE49-F238E27FC236}">
-                <a16:creationId xmlns:a16="http://schemas.microsoft.com/office/drawing/2014/main" id="{755D976C-D592-024C-B5CC-E91CBEC1CF1A}"/>
-              </a:ext>
-            </a:extLst>
-          </p:cNvPr>
-          <p:cNvSpPr>
-            <a:spLocks noGrp="1"/>
-          </p:cNvSpPr>
-          <p:nvPr>
-            <p:ph idx="1"/>
-          </p:nvPr>
-        </p:nvSpPr>
-        <p:spPr/>
-        <p:txBody>
-          <a:bodyPr/>
-          <a:lstStyle/>
-          <a:p>
-            <a:endParaRPr lang="en-US"/>
-          </a:p>
-        </p:txBody>
-      </p:sp>
-      <p:sp>
-        <p:nvSpPr>
-          <p:cNvPr id="4" name="Slide Number Placeholder 3">
-            <a:extLst>
-              <a:ext uri="{FF2B5EF4-FFF2-40B4-BE49-F238E27FC236}">
-                <a16:creationId xmlns:a16="http://schemas.microsoft.com/office/drawing/2014/main" id="{1F7D9FB3-8EC9-9C40-9433-F065D856776B}"/>
-              </a:ext>
-            </a:extLst>
-          </p:cNvPr>
-          <p:cNvSpPr>
-            <a:spLocks noGrp="1"/>
-          </p:cNvSpPr>
-          <p:nvPr>
-            <p:ph type="sldNum" sz="quarter" idx="11"/>
-          </p:nvPr>
-        </p:nvSpPr>
-        <p:spPr/>
-        <p:txBody>
-          <a:bodyPr/>
-          <a:lstStyle/>
-          <a:p>
-            <a:fld id="{4B4332F1-BAE3-4172-AA6D-91F763B329EF}" type="slidenum">
-              <a:rPr lang="en-US" smtClean="0"/>
-              <a:pPr/>
-              <a:t>29</a:t>
-            </a:fld>
-            <a:endParaRPr lang="en-US"/>
-          </a:p>
-        </p:txBody>
-      </p:sp>
-      <p:pic>
-        <p:nvPicPr>
-          <p:cNvPr id="5" name="Picture 6" descr="raven.gif">
-            <a:extLst>
-              <a:ext uri="{FF2B5EF4-FFF2-40B4-BE49-F238E27FC236}">
-                <a16:creationId xmlns:a16="http://schemas.microsoft.com/office/drawing/2014/main" id="{6092F0A2-9434-BB4F-996D-4E529964A968}"/>
-              </a:ext>
-            </a:extLst>
-          </p:cNvPr>
-          <p:cNvPicPr>
-            <a:picLocks noChangeAspect="1"/>
-          </p:cNvPicPr>
-          <p:nvPr/>
-        </p:nvPicPr>
-        <p:blipFill>
-          <a:blip r:embed="rId2">
-            <a:alphaModFix amt="32000"/>
-          </a:blip>
-          <a:srcRect/>
-          <a:stretch>
-            <a:fillRect/>
-          </a:stretch>
-        </p:blipFill>
-        <p:spPr bwMode="auto">
-          <a:xfrm>
-            <a:off x="1134654" y="1381914"/>
-            <a:ext cx="6606116" cy="4954587"/>
-          </a:xfrm>
-          <a:prstGeom prst="rect">
-            <a:avLst/>
-          </a:prstGeom>
-          <a:noFill/>
-          <a:ln w="9525">
-            <a:noFill/>
-            <a:miter lim="800000"/>
-            <a:headEnd/>
-            <a:tailEnd/>
-          </a:ln>
-        </p:spPr>
-      </p:pic>
-    </p:spTree>
-    <p:extLst>
-      <p:ext uri="{BB962C8B-B14F-4D97-AF65-F5344CB8AC3E}">
-        <p14:creationId xmlns:p14="http://schemas.microsoft.com/office/powerpoint/2010/main" val="696426141"/>
+        <p14:creationId xmlns:p14="http://schemas.microsoft.com/office/powerpoint/2010/main" val="1983052083"/>
       </p:ext>
     </p:extLst>
   </p:cSld>
@@ -51445,7 +51603,7 @@
           <p:nvPr/>
         </p:nvPicPr>
         <p:blipFill rotWithShape="1">
-          <a:blip r:embed="rId3">
+          <a:blip r:embed="rId2">
             <a:extLst>
               <a:ext uri="{28A0092B-C50C-407E-A947-70E740481C1C}">
                 <a14:useLocalDpi xmlns:a14="http://schemas.microsoft.com/office/drawing/2010/main" val="0"/>
@@ -51487,7 +51645,7 @@
           <a:p>
             <a:r>
               <a:rPr lang="en-US" b="0" dirty="0"/>
-              <a:t>ROMs: a Quick Introduction</a:t>
+              <a:t>ROMs: a Brief Introduction</a:t>
             </a:r>
           </a:p>
         </p:txBody>
@@ -51596,7 +51754,7 @@
             <a:fld id="{4B4332F1-BAE3-4172-AA6D-91F763B329EF}" type="slidenum">
               <a:rPr lang="en-US" smtClean="0"/>
               <a:pPr/>
-              <a:t>3</a:t>
+              <a:t>2</a:t>
             </a:fld>
             <a:endParaRPr lang="en-US"/>
           </a:p>
@@ -51624,21 +51782,21 @@
           <a:graphicData uri="http://schemas.openxmlformats.org/presentationml/2006/ole">
             <mc:AlternateContent xmlns:mc="http://schemas.openxmlformats.org/markup-compatibility/2006">
               <mc:Choice xmlns:v="urn:schemas-microsoft-com:vml" Requires="v">
-                <p:oleObj spid="_x0000_s7831" name="Equation" r:id="rId4" imgW="635000" imgH="241300" progId="Equation.3">
+                <p:oleObj name="Equation" r:id="rId3" imgW="635000" imgH="241300" progId="Equation.3">
                   <p:embed/>
                 </p:oleObj>
               </mc:Choice>
               <mc:Fallback>
-                <p:oleObj name="Equation" r:id="rId4" imgW="635000" imgH="241300" progId="Equation.3">
+                <p:oleObj name="Equation" r:id="rId3" imgW="635000" imgH="241300" progId="Equation.3">
                   <p:embed/>
                   <p:pic>
                     <p:nvPicPr>
-                      <p:cNvPr id="0" name=""/>
+                      <p:cNvPr id="4" name="Object 3"/>
                       <p:cNvPicPr/>
                       <p:nvPr/>
                     </p:nvPicPr>
                     <p:blipFill>
-                      <a:blip r:embed="rId5"/>
+                      <a:blip r:embed="rId4"/>
                       <a:stretch>
                         <a:fillRect/>
                       </a:stretch>
@@ -51681,21 +51839,21 @@
           <a:graphicData uri="http://schemas.openxmlformats.org/presentationml/2006/ole">
             <mc:AlternateContent xmlns:mc="http://schemas.openxmlformats.org/markup-compatibility/2006">
               <mc:Choice xmlns:v="urn:schemas-microsoft-com:vml" Requires="v">
-                <p:oleObj spid="_x0000_s7832" name="Equation" r:id="rId6" imgW="609600" imgH="177800" progId="Equation.3">
+                <p:oleObj name="Equation" r:id="rId5" imgW="609600" imgH="177800" progId="Equation.3">
                   <p:embed/>
                 </p:oleObj>
               </mc:Choice>
               <mc:Fallback>
-                <p:oleObj name="Equation" r:id="rId6" imgW="609600" imgH="177800" progId="Equation.3">
+                <p:oleObj name="Equation" r:id="rId5" imgW="609600" imgH="177800" progId="Equation.3">
                   <p:embed/>
                   <p:pic>
                     <p:nvPicPr>
-                      <p:cNvPr id="0" name=""/>
+                      <p:cNvPr id="5" name="Object 4"/>
                       <p:cNvPicPr/>
                       <p:nvPr/>
                     </p:nvPicPr>
                     <p:blipFill>
-                      <a:blip r:embed="rId7"/>
+                      <a:blip r:embed="rId6"/>
                       <a:stretch>
                         <a:fillRect/>
                       </a:stretch>
@@ -51895,21 +52053,21 @@
           <a:graphicData uri="http://schemas.openxmlformats.org/presentationml/2006/ole">
             <mc:AlternateContent xmlns:mc="http://schemas.openxmlformats.org/markup-compatibility/2006">
               <mc:Choice xmlns:v="urn:schemas-microsoft-com:vml" Requires="v">
-                <p:oleObj spid="_x0000_s7833" name="Equation" r:id="rId8" imgW="1727200" imgH="241300" progId="Equation.3">
+                <p:oleObj name="Equation" r:id="rId7" imgW="1727200" imgH="241300" progId="Equation.3">
                   <p:embed/>
                 </p:oleObj>
               </mc:Choice>
               <mc:Fallback>
-                <p:oleObj name="Equation" r:id="rId8" imgW="1727200" imgH="241300" progId="Equation.3">
+                <p:oleObj name="Equation" r:id="rId7" imgW="1727200" imgH="241300" progId="Equation.3">
                   <p:embed/>
                   <p:pic>
                     <p:nvPicPr>
-                      <p:cNvPr id="0" name=""/>
+                      <p:cNvPr id="12" name="Object 11"/>
                       <p:cNvPicPr/>
                       <p:nvPr/>
                     </p:nvPicPr>
                     <p:blipFill>
-                      <a:blip r:embed="rId9"/>
+                      <a:blip r:embed="rId8"/>
                       <a:stretch>
                         <a:fillRect/>
                       </a:stretch>
@@ -52365,21 +52523,21 @@
           <a:graphicData uri="http://schemas.openxmlformats.org/presentationml/2006/ole">
             <mc:AlternateContent xmlns:mc="http://schemas.openxmlformats.org/markup-compatibility/2006">
               <mc:Choice xmlns:v="urn:schemas-microsoft-com:vml" Requires="v">
-                <p:oleObj spid="_x0000_s7834" name="Equation" r:id="rId10" imgW="660400" imgH="241300" progId="Equation.3">
+                <p:oleObj name="Equation" r:id="rId9" imgW="660400" imgH="241300" progId="Equation.3">
                   <p:embed/>
                 </p:oleObj>
               </mc:Choice>
               <mc:Fallback>
-                <p:oleObj name="Equation" r:id="rId10" imgW="660400" imgH="241300" progId="Equation.3">
+                <p:oleObj name="Equation" r:id="rId9" imgW="660400" imgH="241300" progId="Equation.3">
                   <p:embed/>
                   <p:pic>
                     <p:nvPicPr>
-                      <p:cNvPr id="0" name=""/>
+                      <p:cNvPr id="29" name="Object 28"/>
                       <p:cNvPicPr/>
                       <p:nvPr/>
                     </p:nvPicPr>
                     <p:blipFill>
-                      <a:blip r:embed="rId11"/>
+                      <a:blip r:embed="rId10"/>
                       <a:stretch>
                         <a:fillRect/>
                       </a:stretch>
@@ -52460,21 +52618,21 @@
           <a:graphicData uri="http://schemas.openxmlformats.org/presentationml/2006/ole">
             <mc:AlternateContent xmlns:mc="http://schemas.openxmlformats.org/markup-compatibility/2006">
               <mc:Choice xmlns:v="urn:schemas-microsoft-com:vml" Requires="v">
-                <p:oleObj spid="_x0000_s7835" name="Equation" r:id="rId12" imgW="342900" imgH="203200" progId="Equation.3">
+                <p:oleObj name="Equation" r:id="rId11" imgW="342900" imgH="203200" progId="Equation.3">
                   <p:embed/>
                 </p:oleObj>
               </mc:Choice>
               <mc:Fallback>
-                <p:oleObj name="Equation" r:id="rId12" imgW="342900" imgH="203200" progId="Equation.3">
+                <p:oleObj name="Equation" r:id="rId11" imgW="342900" imgH="203200" progId="Equation.3">
                   <p:embed/>
                   <p:pic>
                     <p:nvPicPr>
-                      <p:cNvPr id="0" name=""/>
+                      <p:cNvPr id="31" name="Object 30"/>
                       <p:cNvPicPr/>
                       <p:nvPr/>
                     </p:nvPicPr>
                     <p:blipFill>
-                      <a:blip r:embed="rId13"/>
+                      <a:blip r:embed="rId12"/>
                       <a:stretch>
                         <a:fillRect/>
                       </a:stretch>
@@ -52715,21 +52873,21 @@
           <a:graphicData uri="http://schemas.openxmlformats.org/presentationml/2006/ole">
             <mc:AlternateContent xmlns:mc="http://schemas.openxmlformats.org/markup-compatibility/2006">
               <mc:Choice xmlns:v="urn:schemas-microsoft-com:vml" Requires="v">
-                <p:oleObj spid="_x0000_s7836" name="Equation" r:id="rId14" imgW="342900" imgH="203200" progId="Equation.3">
+                <p:oleObj name="Equation" r:id="rId13" imgW="342900" imgH="203200" progId="Equation.3">
                   <p:embed/>
                 </p:oleObj>
               </mc:Choice>
               <mc:Fallback>
-                <p:oleObj name="Equation" r:id="rId14" imgW="342900" imgH="203200" progId="Equation.3">
+                <p:oleObj name="Equation" r:id="rId13" imgW="342900" imgH="203200" progId="Equation.3">
                   <p:embed/>
                   <p:pic>
                     <p:nvPicPr>
-                      <p:cNvPr id="0" name=""/>
+                      <p:cNvPr id="41" name="Object 40"/>
                       <p:cNvPicPr/>
                       <p:nvPr/>
                     </p:nvPicPr>
                     <p:blipFill>
-                      <a:blip r:embed="rId15"/>
+                      <a:blip r:embed="rId14"/>
                       <a:stretch>
                         <a:fillRect/>
                       </a:stretch>
@@ -52849,6 +53007,100 @@
       </p:grpSpPr>
       <p:sp>
         <p:nvSpPr>
+          <p:cNvPr id="2" name="Title 1">
+            <a:extLst>
+              <a:ext uri="{FF2B5EF4-FFF2-40B4-BE49-F238E27FC236}">
+                <a16:creationId xmlns:a16="http://schemas.microsoft.com/office/drawing/2014/main" id="{CED2C86B-FDE4-E245-8582-7DA1BEF79C84}"/>
+              </a:ext>
+            </a:extLst>
+          </p:cNvPr>
+          <p:cNvSpPr>
+            <a:spLocks noGrp="1"/>
+          </p:cNvSpPr>
+          <p:nvPr>
+            <p:ph type="title"/>
+          </p:nvPr>
+        </p:nvSpPr>
+        <p:spPr>
+          <a:xfrm>
+            <a:off x="456406" y="3240487"/>
+            <a:ext cx="8231187" cy="627864"/>
+          </a:xfrm>
+        </p:spPr>
+        <p:txBody>
+          <a:bodyPr/>
+          <a:lstStyle/>
+          <a:p>
+            <a:pPr algn="ctr"/>
+            <a:r>
+              <a:rPr lang="en-US" sz="4800" dirty="0"/>
+              <a:t>Backup Slides</a:t>
+            </a:r>
+          </a:p>
+        </p:txBody>
+      </p:sp>
+      <p:sp>
+        <p:nvSpPr>
+          <p:cNvPr id="4" name="Slide Number Placeholder 3">
+            <a:extLst>
+              <a:ext uri="{FF2B5EF4-FFF2-40B4-BE49-F238E27FC236}">
+                <a16:creationId xmlns:a16="http://schemas.microsoft.com/office/drawing/2014/main" id="{1F7D9FB3-8EC9-9C40-9433-F065D856776B}"/>
+              </a:ext>
+            </a:extLst>
+          </p:cNvPr>
+          <p:cNvSpPr>
+            <a:spLocks noGrp="1"/>
+          </p:cNvSpPr>
+          <p:nvPr>
+            <p:ph type="sldNum" sz="quarter" idx="11"/>
+          </p:nvPr>
+        </p:nvSpPr>
+        <p:spPr/>
+        <p:txBody>
+          <a:bodyPr/>
+          <a:lstStyle/>
+          <a:p>
+            <a:fld id="{4B4332F1-BAE3-4172-AA6D-91F763B329EF}" type="slidenum">
+              <a:rPr lang="en-US" smtClean="0"/>
+              <a:pPr/>
+              <a:t>29</a:t>
+            </a:fld>
+            <a:endParaRPr lang="en-US"/>
+          </a:p>
+        </p:txBody>
+      </p:sp>
+    </p:spTree>
+    <p:extLst>
+      <p:ext uri="{BB962C8B-B14F-4D97-AF65-F5344CB8AC3E}">
+        <p14:creationId xmlns:p14="http://schemas.microsoft.com/office/powerpoint/2010/main" val="696426141"/>
+      </p:ext>
+    </p:extLst>
+  </p:cSld>
+  <p:clrMapOvr>
+    <a:masterClrMapping/>
+  </p:clrMapOvr>
+</p:sld>
+</file>
+
+<file path=ppt/slides/slide31.xml><?xml version="1.0" encoding="utf-8"?>
+<p:sld xmlns:a="http://schemas.openxmlformats.org/drawingml/2006/main" xmlns:r="http://schemas.openxmlformats.org/officeDocument/2006/relationships" xmlns:p="http://schemas.openxmlformats.org/presentationml/2006/main">
+  <p:cSld>
+    <p:spTree>
+      <p:nvGrpSpPr>
+        <p:cNvPr id="1" name=""/>
+        <p:cNvGrpSpPr/>
+        <p:nvPr/>
+      </p:nvGrpSpPr>
+      <p:grpSpPr>
+        <a:xfrm>
+          <a:off x="0" y="0"/>
+          <a:ext cx="0" cy="0"/>
+          <a:chOff x="0" y="0"/>
+          <a:chExt cx="0" cy="0"/>
+        </a:xfrm>
+      </p:grpSpPr>
+      <p:sp>
+        <p:nvSpPr>
           <p:cNvPr id="2" name="Title 1"/>
           <p:cNvSpPr>
             <a:spLocks noGrp="1"/>
@@ -53008,21 +53260,21 @@
           <a:graphicData uri="http://schemas.openxmlformats.org/presentationml/2006/ole">
             <mc:AlternateContent xmlns:mc="http://schemas.openxmlformats.org/markup-compatibility/2006">
               <mc:Choice xmlns:v="urn:schemas-microsoft-com:vml" Requires="v">
-                <p:oleObj spid="_x0000_s5632" name="Equation" r:id="rId3" imgW="1244600" imgH="457200" progId="Equation.3">
+                <p:oleObj name="Equation" r:id="rId2" imgW="1244600" imgH="457200" progId="Equation.3">
                   <p:embed/>
                 </p:oleObj>
               </mc:Choice>
               <mc:Fallback>
-                <p:oleObj name="Equation" r:id="rId3" imgW="1244600" imgH="457200" progId="Equation.3">
+                <p:oleObj name="Equation" r:id="rId2" imgW="1244600" imgH="457200" progId="Equation.3">
                   <p:embed/>
                   <p:pic>
                     <p:nvPicPr>
-                      <p:cNvPr id="0" name=""/>
+                      <p:cNvPr id="7" name="Object 6"/>
                       <p:cNvPicPr/>
                       <p:nvPr/>
                     </p:nvPicPr>
                     <p:blipFill>
-                      <a:blip r:embed="rId4"/>
+                      <a:blip r:embed="rId3"/>
                       <a:stretch>
                         <a:fillRect/>
                       </a:stretch>
@@ -53065,21 +53317,21 @@
           <a:graphicData uri="http://schemas.openxmlformats.org/presentationml/2006/ole">
             <mc:AlternateContent xmlns:mc="http://schemas.openxmlformats.org/markup-compatibility/2006">
               <mc:Choice xmlns:v="urn:schemas-microsoft-com:vml" Requires="v">
-                <p:oleObj spid="_x0000_s5633" name="Equation" r:id="rId5" imgW="1295400" imgH="393700" progId="Equation.3">
+                <p:oleObj name="Equation" r:id="rId4" imgW="1295400" imgH="393700" progId="Equation.3">
                   <p:embed/>
                 </p:oleObj>
               </mc:Choice>
               <mc:Fallback>
-                <p:oleObj name="Equation" r:id="rId5" imgW="1295400" imgH="393700" progId="Equation.3">
+                <p:oleObj name="Equation" r:id="rId4" imgW="1295400" imgH="393700" progId="Equation.3">
                   <p:embed/>
                   <p:pic>
                     <p:nvPicPr>
-                      <p:cNvPr id="0" name=""/>
+                      <p:cNvPr id="8" name="Object 7"/>
                       <p:cNvPicPr/>
                       <p:nvPr/>
                     </p:nvPicPr>
                     <p:blipFill>
-                      <a:blip r:embed="rId6"/>
+                      <a:blip r:embed="rId5"/>
                       <a:stretch>
                         <a:fillRect/>
                       </a:stretch>
@@ -53122,21 +53374,21 @@
           <a:graphicData uri="http://schemas.openxmlformats.org/presentationml/2006/ole">
             <mc:AlternateContent xmlns:mc="http://schemas.openxmlformats.org/markup-compatibility/2006">
               <mc:Choice xmlns:v="urn:schemas-microsoft-com:vml" Requires="v">
-                <p:oleObj spid="_x0000_s5634" name="Equation" r:id="rId7" imgW="419100" imgH="215900" progId="Equation.3">
+                <p:oleObj name="Equation" r:id="rId6" imgW="419100" imgH="215900" progId="Equation.3">
                   <p:embed/>
                 </p:oleObj>
               </mc:Choice>
               <mc:Fallback>
-                <p:oleObj name="Equation" r:id="rId7" imgW="419100" imgH="215900" progId="Equation.3">
+                <p:oleObj name="Equation" r:id="rId6" imgW="419100" imgH="215900" progId="Equation.3">
                   <p:embed/>
                   <p:pic>
                     <p:nvPicPr>
-                      <p:cNvPr id="0" name=""/>
+                      <p:cNvPr id="11" name="Object 10"/>
                       <p:cNvPicPr/>
                       <p:nvPr/>
                     </p:nvPicPr>
                     <p:blipFill>
-                      <a:blip r:embed="rId8"/>
+                      <a:blip r:embed="rId7"/>
                       <a:stretch>
                         <a:fillRect/>
                       </a:stretch>
@@ -53440,7 +53692,7 @@
           <a:p>
             <a:r>
               <a:rPr lang="en-US" b="0" dirty="0"/>
-              <a:t>ROMs: a Quick Introduction</a:t>
+              <a:t>ROMs: a Brief Introduction</a:t>
             </a:r>
             <a:endParaRPr lang="en-US" dirty="0"/>
           </a:p>
@@ -53595,7 +53847,7 @@
             <a:fld id="{4B4332F1-BAE3-4172-AA6D-91F763B329EF}" type="slidenum">
               <a:rPr lang="en-US" smtClean="0"/>
               <a:pPr/>
-              <a:t>4</a:t>
+              <a:t>3</a:t>
             </a:fld>
             <a:endParaRPr lang="en-US"/>
           </a:p>
@@ -53623,21 +53875,21 @@
           <a:graphicData uri="http://schemas.openxmlformats.org/presentationml/2006/ole">
             <mc:AlternateContent xmlns:mc="http://schemas.openxmlformats.org/markup-compatibility/2006">
               <mc:Choice xmlns:v="urn:schemas-microsoft-com:vml" Requires="v">
-                <p:oleObj spid="_x0000_s3299" name="Equation" r:id="rId3" imgW="1727200" imgH="241300" progId="Equation.3">
+                <p:oleObj name="Equation" r:id="rId2" imgW="1727200" imgH="241300" progId="Equation.3">
                   <p:embed/>
                 </p:oleObj>
               </mc:Choice>
               <mc:Fallback>
-                <p:oleObj name="Equation" r:id="rId3" imgW="1727200" imgH="241300" progId="Equation.3">
+                <p:oleObj name="Equation" r:id="rId2" imgW="1727200" imgH="241300" progId="Equation.3">
                   <p:embed/>
                   <p:pic>
                     <p:nvPicPr>
-                      <p:cNvPr id="0" name=""/>
+                      <p:cNvPr id="10" name="Object 9"/>
                       <p:cNvPicPr/>
                       <p:nvPr/>
                     </p:nvPicPr>
                     <p:blipFill>
-                      <a:blip r:embed="rId4"/>
+                      <a:blip r:embed="rId3"/>
                       <a:stretch>
                         <a:fillRect/>
                       </a:stretch>
@@ -54014,6 +54266,16 @@
             </a:pPr>
             <a:r>
               <a:rPr lang="en-US" dirty="0"/>
+              <a:t>Validate the ROM</a:t>
+            </a:r>
+          </a:p>
+          <a:p>
+            <a:pPr marL="914400" lvl="1" indent="-457200">
+              <a:buFont typeface="+mj-lt"/>
+              <a:buAutoNum type="arabicPeriod"/>
+            </a:pPr>
+            <a:r>
+              <a:rPr lang="en-US" dirty="0"/>
               <a:t>Perform desired analysis with the ROM </a:t>
             </a:r>
           </a:p>
@@ -54027,12 +54289,9 @@
             </a:r>
           </a:p>
           <a:p>
-            <a:pPr marL="457200" lvl="1" indent="0">
+            <a:pPr marL="0" indent="0">
               <a:buNone/>
             </a:pPr>
-            <a:endParaRPr lang="en-US" dirty="0"/>
-          </a:p>
-          <a:p>
             <a:endParaRPr lang="en-US" dirty="0"/>
           </a:p>
           <a:p>
@@ -54099,7 +54358,7 @@
             <a:fld id="{4B4332F1-BAE3-4172-AA6D-91F763B329EF}" type="slidenum">
               <a:rPr lang="en-US" smtClean="0"/>
               <a:pPr/>
-              <a:t>5</a:t>
+              <a:t>4</a:t>
             </a:fld>
             <a:endParaRPr lang="en-US"/>
           </a:p>
@@ -54114,7 +54373,7 @@
           <p:nvPr/>
         </p:nvPicPr>
         <p:blipFill>
-          <a:blip r:embed="rId3">
+          <a:blip r:embed="rId2">
             <a:clrChange>
               <a:clrFrom>
                 <a:srgbClr val="FFFFFF"/>
@@ -54224,21 +54483,21 @@
           <a:graphicData uri="http://schemas.openxmlformats.org/presentationml/2006/ole">
             <mc:AlternateContent xmlns:mc="http://schemas.openxmlformats.org/markup-compatibility/2006">
               <mc:Choice xmlns:v="urn:schemas-microsoft-com:vml" Requires="v">
-                <p:oleObj spid="_x0000_s12380" name="Equation" r:id="rId4" imgW="647700" imgH="165100" progId="Equation.3">
+                <p:oleObj name="Equation" r:id="rId3" imgW="647700" imgH="165100" progId="Equation.3">
                   <p:embed/>
                 </p:oleObj>
               </mc:Choice>
               <mc:Fallback>
-                <p:oleObj name="Equation" r:id="rId4" imgW="647700" imgH="165100" progId="Equation.3">
+                <p:oleObj name="Equation" r:id="rId3" imgW="647700" imgH="165100" progId="Equation.3">
                   <p:embed/>
                   <p:pic>
                     <p:nvPicPr>
-                      <p:cNvPr id="0" name=""/>
+                      <p:cNvPr id="8" name="Object 7"/>
                       <p:cNvPicPr/>
                       <p:nvPr/>
                     </p:nvPicPr>
                     <p:blipFill>
-                      <a:blip r:embed="rId5"/>
+                      <a:blip r:embed="rId4"/>
                       <a:stretch>
                         <a:fillRect/>
                       </a:stretch>
@@ -54569,7 +54828,7 @@
             <a:fld id="{4B4332F1-BAE3-4172-AA6D-91F763B329EF}" type="slidenum">
               <a:rPr lang="en-US" smtClean="0"/>
               <a:pPr/>
-              <a:t>6</a:t>
+              <a:t>5</a:t>
             </a:fld>
             <a:endParaRPr lang="en-US"/>
           </a:p>
@@ -55004,7 +55263,7 @@
             <a:fld id="{4B4332F1-BAE3-4172-AA6D-91F763B329EF}" type="slidenum">
               <a:rPr lang="en-US" smtClean="0"/>
               <a:pPr/>
-              <a:t>7</a:t>
+              <a:t>6</a:t>
             </a:fld>
             <a:endParaRPr lang="en-US"/>
           </a:p>
@@ -55393,7 +55652,7 @@
             <a:fld id="{4B4332F1-BAE3-4172-AA6D-91F763B329EF}" type="slidenum">
               <a:rPr lang="en-US" smtClean="0"/>
               <a:pPr/>
-              <a:t>8</a:t>
+              <a:t>7</a:t>
             </a:fld>
             <a:endParaRPr lang="en-US"/>
           </a:p>
@@ -55689,7 +55948,7 @@
             <a:fld id="{4B4332F1-BAE3-4172-AA6D-91F763B329EF}" type="slidenum">
               <a:rPr lang="en-US" smtClean="0"/>
               <a:pPr/>
-              <a:t>9</a:t>
+              <a:t>8</a:t>
             </a:fld>
             <a:endParaRPr lang="en-US"/>
           </a:p>

</xml_diff>